<commit_message>
resize box route, station, trip, pathinfo
</commit_message>
<xml_diff>
--- a/Document/presentation/parse.pptx
+++ b/Document/presentation/parse.pptx
@@ -21,9 +21,9 @@
     <p:sldId id="305" r:id="rId15"/>
     <p:sldId id="302" r:id="rId16"/>
     <p:sldId id="306" r:id="rId17"/>
-    <p:sldId id="303" r:id="rId18"/>
-    <p:sldId id="285" r:id="rId19"/>
-    <p:sldId id="282" r:id="rId20"/>
+    <p:sldId id="310" r:id="rId18"/>
+    <p:sldId id="303" r:id="rId19"/>
+    <p:sldId id="285" r:id="rId20"/>
     <p:sldId id="307" r:id="rId21"/>
     <p:sldId id="286" r:id="rId22"/>
     <p:sldId id="309" r:id="rId23"/>
@@ -270,7 +270,7 @@
           <a:p>
             <a:fld id="{350F96C4-0C79-4454-B2EB-769C6423A21F}" type="datetimeFigureOut">
               <a:rPr lang="en-US" smtClean="0"/>
-              <a:t>12/9/2015</a:t>
+              <a:t>12/10/2015</a:t>
             </a:fld>
             <a:endParaRPr lang="en-US"/>
           </a:p>
@@ -440,7 +440,7 @@
           <a:p>
             <a:fld id="{350F96C4-0C79-4454-B2EB-769C6423A21F}" type="datetimeFigureOut">
               <a:rPr lang="en-US" smtClean="0"/>
-              <a:t>12/9/2015</a:t>
+              <a:t>12/10/2015</a:t>
             </a:fld>
             <a:endParaRPr lang="en-US"/>
           </a:p>
@@ -620,7 +620,7 @@
           <a:p>
             <a:fld id="{350F96C4-0C79-4454-B2EB-769C6423A21F}" type="datetimeFigureOut">
               <a:rPr lang="en-US" smtClean="0"/>
-              <a:t>12/9/2015</a:t>
+              <a:t>12/10/2015</a:t>
             </a:fld>
             <a:endParaRPr lang="en-US"/>
           </a:p>
@@ -790,7 +790,7 @@
           <a:p>
             <a:fld id="{350F96C4-0C79-4454-B2EB-769C6423A21F}" type="datetimeFigureOut">
               <a:rPr lang="en-US" smtClean="0"/>
-              <a:t>12/9/2015</a:t>
+              <a:t>12/10/2015</a:t>
             </a:fld>
             <a:endParaRPr lang="en-US"/>
           </a:p>
@@ -1034,7 +1034,7 @@
           <a:p>
             <a:fld id="{350F96C4-0C79-4454-B2EB-769C6423A21F}" type="datetimeFigureOut">
               <a:rPr lang="en-US" smtClean="0"/>
-              <a:t>12/9/2015</a:t>
+              <a:t>12/10/2015</a:t>
             </a:fld>
             <a:endParaRPr lang="en-US"/>
           </a:p>
@@ -1266,7 +1266,7 @@
           <a:p>
             <a:fld id="{350F96C4-0C79-4454-B2EB-769C6423A21F}" type="datetimeFigureOut">
               <a:rPr lang="en-US" smtClean="0"/>
-              <a:t>12/9/2015</a:t>
+              <a:t>12/10/2015</a:t>
             </a:fld>
             <a:endParaRPr lang="en-US"/>
           </a:p>
@@ -1633,7 +1633,7 @@
           <a:p>
             <a:fld id="{350F96C4-0C79-4454-B2EB-769C6423A21F}" type="datetimeFigureOut">
               <a:rPr lang="en-US" smtClean="0"/>
-              <a:t>12/9/2015</a:t>
+              <a:t>12/10/2015</a:t>
             </a:fld>
             <a:endParaRPr lang="en-US"/>
           </a:p>
@@ -1751,7 +1751,7 @@
           <a:p>
             <a:fld id="{350F96C4-0C79-4454-B2EB-769C6423A21F}" type="datetimeFigureOut">
               <a:rPr lang="en-US" smtClean="0"/>
-              <a:t>12/9/2015</a:t>
+              <a:t>12/10/2015</a:t>
             </a:fld>
             <a:endParaRPr lang="en-US"/>
           </a:p>
@@ -1846,7 +1846,7 @@
           <a:p>
             <a:fld id="{350F96C4-0C79-4454-B2EB-769C6423A21F}" type="datetimeFigureOut">
               <a:rPr lang="en-US" smtClean="0"/>
-              <a:t>12/9/2015</a:t>
+              <a:t>12/10/2015</a:t>
             </a:fld>
             <a:endParaRPr lang="en-US"/>
           </a:p>
@@ -2123,7 +2123,7 @@
           <a:p>
             <a:fld id="{350F96C4-0C79-4454-B2EB-769C6423A21F}" type="datetimeFigureOut">
               <a:rPr lang="en-US" smtClean="0"/>
-              <a:t>12/9/2015</a:t>
+              <a:t>12/10/2015</a:t>
             </a:fld>
             <a:endParaRPr lang="en-US"/>
           </a:p>
@@ -2380,7 +2380,7 @@
           <a:p>
             <a:fld id="{350F96C4-0C79-4454-B2EB-769C6423A21F}" type="datetimeFigureOut">
               <a:rPr lang="en-US" smtClean="0"/>
-              <a:t>12/9/2015</a:t>
+              <a:t>12/10/2015</a:t>
             </a:fld>
             <a:endParaRPr lang="en-US"/>
           </a:p>
@@ -2593,7 +2593,7 @@
           <a:p>
             <a:fld id="{350F96C4-0C79-4454-B2EB-769C6423A21F}" type="datetimeFigureOut">
               <a:rPr lang="en-US" smtClean="0"/>
-              <a:t>12/9/2015</a:t>
+              <a:t>12/10/2015</a:t>
             </a:fld>
             <a:endParaRPr lang="en-US"/>
           </a:p>
@@ -6931,8 +6931,8 @@
         </p:nvSpPr>
         <p:spPr>
           <a:xfrm>
-            <a:off x="666572" y="384561"/>
-            <a:ext cx="7810856" cy="5896598"/>
+            <a:off x="0" y="0"/>
+            <a:ext cx="9144000" cy="6858000"/>
           </a:xfrm>
           <a:prstGeom prst="rect">
             <a:avLst/>
@@ -7933,6 +7933,1339 @@
 </file>
 
 <file path=ppt/slides/slide17.xml><?xml version="1.0" encoding="utf-8"?>
+<p:sld xmlns:a="http://schemas.openxmlformats.org/drawingml/2006/main" xmlns:r="http://schemas.openxmlformats.org/officeDocument/2006/relationships" xmlns:p="http://schemas.openxmlformats.org/presentationml/2006/main">
+  <p:cSld>
+    <p:spTree>
+      <p:nvGrpSpPr>
+        <p:cNvPr id="1" name=""/>
+        <p:cNvGrpSpPr/>
+        <p:nvPr/>
+      </p:nvGrpSpPr>
+      <p:grpSpPr>
+        <a:xfrm>
+          <a:off x="0" y="0"/>
+          <a:ext cx="0" cy="0"/>
+          <a:chOff x="0" y="0"/>
+          <a:chExt cx="0" cy="0"/>
+        </a:xfrm>
+      </p:grpSpPr>
+      <p:graphicFrame>
+        <p:nvGraphicFramePr>
+          <p:cNvPr id="18" name="Table 17"/>
+          <p:cNvGraphicFramePr>
+            <a:graphicFrameLocks noGrp="1"/>
+          </p:cNvGraphicFramePr>
+          <p:nvPr>
+            <p:extLst>
+              <p:ext uri="{D42A27DB-BD31-4B8C-83A1-F6EECF244321}">
+                <p14:modId xmlns:p14="http://schemas.microsoft.com/office/powerpoint/2010/main" val="2999056806"/>
+              </p:ext>
+            </p:extLst>
+          </p:nvPr>
+        </p:nvGraphicFramePr>
+        <p:xfrm>
+          <a:off x="137159" y="76914"/>
+          <a:ext cx="5742347" cy="5978623"/>
+        </p:xfrm>
+        <a:graphic>
+          <a:graphicData uri="http://schemas.openxmlformats.org/drawingml/2006/table">
+            <a:tbl>
+              <a:tblPr firstRow="1" bandRow="1">
+                <a:tableStyleId>{5C22544A-7EE6-4342-B048-85BDC9FD1C3A}</a:tableStyleId>
+              </a:tblPr>
+              <a:tblGrid>
+                <a:gridCol w="754659"/>
+                <a:gridCol w="4987688"/>
+              </a:tblGrid>
+              <a:tr h="394829">
+                <a:tc>
+                  <a:txBody>
+                    <a:bodyPr/>
+                    <a:lstStyle/>
+                    <a:p>
+                      <a:pPr algn="ctr"/>
+                      <a:r>
+                        <a:rPr lang="en-US" sz="1600" dirty="0" smtClean="0"/>
+                        <a:t>Index</a:t>
+                      </a:r>
+                      <a:endParaRPr lang="en-US" sz="1600" dirty="0"/>
+                    </a:p>
+                  </a:txBody>
+                  <a:tcPr/>
+                </a:tc>
+                <a:tc>
+                  <a:txBody>
+                    <a:bodyPr/>
+                    <a:lstStyle/>
+                    <a:p>
+                      <a:pPr algn="ctr"/>
+                      <a:r>
+                        <a:rPr lang="en-US" dirty="0" smtClean="0"/>
+                        <a:t>Sample value</a:t>
+                      </a:r>
+                      <a:endParaRPr lang="en-US" dirty="0"/>
+                    </a:p>
+                  </a:txBody>
+                  <a:tcPr/>
+                </a:tc>
+              </a:tr>
+              <a:tr h="366218">
+                <a:tc>
+                  <a:txBody>
+                    <a:bodyPr/>
+                    <a:lstStyle/>
+                    <a:p>
+                      <a:pPr algn="ctr"/>
+                      <a:r>
+                        <a:rPr lang="en-US" dirty="0" smtClean="0"/>
+                        <a:t>0</a:t>
+                      </a:r>
+                      <a:endParaRPr lang="en-US" dirty="0"/>
+                    </a:p>
+                  </a:txBody>
+                  <a:tcPr/>
+                </a:tc>
+                <a:tc>
+                  <a:txBody>
+                    <a:bodyPr/>
+                    <a:lstStyle/>
+                    <a:p>
+                      <a:pPr algn="ctr"/>
+                      <a:r>
+                        <a:rPr lang="en-US" dirty="0" smtClean="0"/>
+                        <a:t>1</a:t>
+                      </a:r>
+                      <a:endParaRPr lang="en-US" dirty="0"/>
+                    </a:p>
+                  </a:txBody>
+                  <a:tcPr/>
+                </a:tc>
+              </a:tr>
+              <a:tr h="366218">
+                <a:tc>
+                  <a:txBody>
+                    <a:bodyPr/>
+                    <a:lstStyle/>
+                    <a:p>
+                      <a:pPr algn="ctr"/>
+                      <a:r>
+                        <a:rPr lang="en-US" dirty="0" smtClean="0"/>
+                        <a:t>1</a:t>
+                      </a:r>
+                      <a:endParaRPr lang="en-US" dirty="0"/>
+                    </a:p>
+                  </a:txBody>
+                  <a:tcPr/>
+                </a:tc>
+                <a:tc>
+                  <a:txBody>
+                    <a:bodyPr/>
+                    <a:lstStyle/>
+                    <a:p>
+                      <a:pPr algn="ctr"/>
+                      <a:r>
+                        <a:rPr lang="en-US" dirty="0" smtClean="0"/>
+                        <a:t>8999</a:t>
+                      </a:r>
+                      <a:endParaRPr lang="en-US" dirty="0"/>
+                    </a:p>
+                  </a:txBody>
+                  <a:tcPr/>
+                </a:tc>
+              </a:tr>
+              <a:tr h="366218">
+                <a:tc>
+                  <a:txBody>
+                    <a:bodyPr/>
+                    <a:lstStyle/>
+                    <a:p>
+                      <a:pPr algn="ctr"/>
+                      <a:r>
+                        <a:rPr lang="en-US" dirty="0" smtClean="0"/>
+                        <a:t>2</a:t>
+                      </a:r>
+                      <a:endParaRPr lang="en-US" dirty="0"/>
+                    </a:p>
+                  </a:txBody>
+                  <a:tcPr/>
+                </a:tc>
+                <a:tc>
+                  <a:txBody>
+                    <a:bodyPr/>
+                    <a:lstStyle/>
+                    <a:p>
+                      <a:pPr algn="ctr"/>
+                      <a:r>
+                        <a:rPr lang="en-US" dirty="0" smtClean="0"/>
+                        <a:t>8994</a:t>
+                      </a:r>
+                      <a:endParaRPr lang="en-US" dirty="0"/>
+                    </a:p>
+                  </a:txBody>
+                  <a:tcPr/>
+                </a:tc>
+              </a:tr>
+              <a:tr h="366218">
+                <a:tc>
+                  <a:txBody>
+                    <a:bodyPr/>
+                    <a:lstStyle/>
+                    <a:p>
+                      <a:pPr algn="ctr"/>
+                      <a:r>
+                        <a:rPr lang="en-US" dirty="0" smtClean="0"/>
+                        <a:t>3</a:t>
+                      </a:r>
+                      <a:endParaRPr lang="en-US" dirty="0"/>
+                    </a:p>
+                  </a:txBody>
+                  <a:tcPr/>
+                </a:tc>
+                <a:tc>
+                  <a:txBody>
+                    <a:bodyPr/>
+                    <a:lstStyle/>
+                    <a:p>
+                      <a:pPr marL="0" marR="0" indent="0" algn="ctr" defTabSz="914400" rtl="0" eaLnBrk="1" fontAlgn="auto" latinLnBrk="0" hangingPunct="1">
+                        <a:lnSpc>
+                          <a:spcPct val="100000"/>
+                        </a:lnSpc>
+                        <a:spcBef>
+                          <a:spcPts val="0"/>
+                        </a:spcBef>
+                        <a:spcAft>
+                          <a:spcPts val="0"/>
+                        </a:spcAft>
+                        <a:buClrTx/>
+                        <a:buSzTx/>
+                        <a:buFontTx/>
+                        <a:buNone/>
+                        <a:tabLst/>
+                        <a:defRPr/>
+                      </a:pPr>
+                      <a:r>
+                        <a:rPr lang="en-US" sz="1600" b="0" i="0" kern="1200" dirty="0" smtClean="0">
+                          <a:solidFill>
+                            <a:schemeClr val="dk1"/>
+                          </a:solidFill>
+                          <a:effectLst/>
+                          <a:latin typeface="Cambria" panose="02040503050406030204" pitchFamily="18" charset="0"/>
+                          <a:ea typeface="+mn-ea"/>
+                          <a:cs typeface="+mn-cs"/>
+                        </a:rPr>
+                        <a:t>106.70589000000001,10.776800000000001 106.70627,10.775810000000002 106.70623,10.77579 106.70617000000001,10.77576 ...</a:t>
+                      </a:r>
+                      <a:endParaRPr lang="en-US" sz="1600" dirty="0" smtClean="0">
+                        <a:latin typeface="Cambria" panose="02040503050406030204" pitchFamily="18" charset="0"/>
+                      </a:endParaRPr>
+                    </a:p>
+                  </a:txBody>
+                  <a:tcPr/>
+                </a:tc>
+              </a:tr>
+              <a:tr h="366218">
+                <a:tc>
+                  <a:txBody>
+                    <a:bodyPr/>
+                    <a:lstStyle/>
+                    <a:p>
+                      <a:pPr algn="ctr"/>
+                      <a:r>
+                        <a:rPr lang="en-US" dirty="0" smtClean="0"/>
+                        <a:t>4</a:t>
+                      </a:r>
+                      <a:endParaRPr lang="en-US" dirty="0"/>
+                    </a:p>
+                  </a:txBody>
+                  <a:tcPr/>
+                </a:tc>
+                <a:tc>
+                  <a:txBody>
+                    <a:bodyPr/>
+                    <a:lstStyle/>
+                    <a:p>
+                      <a:pPr algn="ctr"/>
+                      <a:r>
+                        <a:rPr lang="en-US" dirty="0" smtClean="0"/>
+                        <a:t>True</a:t>
+                      </a:r>
+                      <a:endParaRPr lang="en-US" dirty="0"/>
+                    </a:p>
+                  </a:txBody>
+                  <a:tcPr/>
+                </a:tc>
+              </a:tr>
+              <a:tr h="366218">
+                <a:tc>
+                  <a:txBody>
+                    <a:bodyPr/>
+                    <a:lstStyle/>
+                    <a:p>
+                      <a:pPr algn="ctr"/>
+                      <a:r>
+                        <a:rPr lang="en-US" dirty="0" smtClean="0"/>
+                        <a:t>5</a:t>
+                      </a:r>
+                      <a:endParaRPr lang="en-US" dirty="0"/>
+                    </a:p>
+                  </a:txBody>
+                  <a:tcPr/>
+                </a:tc>
+                <a:tc>
+                  <a:txBody>
+                    <a:bodyPr/>
+                    <a:lstStyle/>
+                    <a:p>
+                      <a:pPr algn="ctr"/>
+                      <a:r>
+                        <a:rPr lang="en-US" sz="1800" b="0" i="0" kern="1200" dirty="0" smtClean="0">
+                          <a:solidFill>
+                            <a:schemeClr val="dk1"/>
+                          </a:solidFill>
+                          <a:effectLst/>
+                          <a:latin typeface="+mn-lt"/>
+                          <a:ea typeface="+mn-ea"/>
+                          <a:cs typeface="+mn-cs"/>
+                        </a:rPr>
+                        <a:t>1</a:t>
+                      </a:r>
+                      <a:endParaRPr lang="en-US" dirty="0"/>
+                    </a:p>
+                  </a:txBody>
+                  <a:tcPr/>
+                </a:tc>
+              </a:tr>
+              <a:tr h="366218">
+                <a:tc>
+                  <a:txBody>
+                    <a:bodyPr/>
+                    <a:lstStyle/>
+                    <a:p>
+                      <a:pPr algn="ctr"/>
+                      <a:r>
+                        <a:rPr lang="en-US" dirty="0" smtClean="0"/>
+                        <a:t>6</a:t>
+                      </a:r>
+                      <a:endParaRPr lang="en-US" dirty="0"/>
+                    </a:p>
+                  </a:txBody>
+                  <a:tcPr/>
+                </a:tc>
+                <a:tc>
+                  <a:txBody>
+                    <a:bodyPr/>
+                    <a:lstStyle/>
+                    <a:p>
+                      <a:pPr algn="ctr"/>
+                      <a:r>
+                        <a:rPr lang="en-US" sz="1800" b="0" i="0" kern="1200" dirty="0" smtClean="0">
+                          <a:solidFill>
+                            <a:schemeClr val="dk1"/>
+                          </a:solidFill>
+                          <a:effectLst/>
+                          <a:latin typeface="+mn-lt"/>
+                          <a:ea typeface="+mn-ea"/>
+                          <a:cs typeface="+mn-cs"/>
+                        </a:rPr>
+                        <a:t>468.747807122203</a:t>
+                      </a:r>
+                      <a:endParaRPr lang="en-US" dirty="0"/>
+                    </a:p>
+                  </a:txBody>
+                  <a:tcPr/>
+                </a:tc>
+              </a:tr>
+              <a:tr h="366218">
+                <a:tc>
+                  <a:txBody>
+                    <a:bodyPr/>
+                    <a:lstStyle/>
+                    <a:p>
+                      <a:pPr algn="ctr"/>
+                      <a:r>
+                        <a:rPr lang="en-US" dirty="0" smtClean="0"/>
+                        <a:t>7</a:t>
+                      </a:r>
+                      <a:endParaRPr lang="en-US" dirty="0"/>
+                    </a:p>
+                  </a:txBody>
+                  <a:tcPr/>
+                </a:tc>
+                <a:tc>
+                  <a:txBody>
+                    <a:bodyPr/>
+                    <a:lstStyle/>
+                    <a:p>
+                      <a:pPr algn="ctr"/>
+                      <a:r>
+                        <a:rPr lang="vi-VN" sz="1800" b="0" i="0" kern="1200" dirty="0" smtClean="0">
+                          <a:solidFill>
+                            <a:schemeClr val="dk1"/>
+                          </a:solidFill>
+                          <a:effectLst/>
+                          <a:latin typeface="+mn-lt"/>
+                          <a:ea typeface="+mn-ea"/>
+                          <a:cs typeface="+mn-cs"/>
+                        </a:rPr>
+                        <a:t>Công Trường Mê Linh</a:t>
+                      </a:r>
+                      <a:endParaRPr lang="en-US" dirty="0"/>
+                    </a:p>
+                  </a:txBody>
+                  <a:tcPr/>
+                </a:tc>
+              </a:tr>
+              <a:tr h="366218">
+                <a:tc>
+                  <a:txBody>
+                    <a:bodyPr/>
+                    <a:lstStyle/>
+                    <a:p>
+                      <a:pPr algn="ctr"/>
+                      <a:r>
+                        <a:rPr lang="en-US" dirty="0" smtClean="0"/>
+                        <a:t>8</a:t>
+                      </a:r>
+                      <a:endParaRPr lang="en-US" dirty="0"/>
+                    </a:p>
+                  </a:txBody>
+                  <a:tcPr/>
+                </a:tc>
+                <a:tc>
+                  <a:txBody>
+                    <a:bodyPr/>
+                    <a:lstStyle/>
+                    <a:p>
+                      <a:pPr algn="ctr"/>
+                      <a:r>
+                        <a:rPr lang="en-US" sz="1800" b="0" i="0" kern="1200" dirty="0" smtClean="0">
+                          <a:solidFill>
+                            <a:schemeClr val="dk1"/>
+                          </a:solidFill>
+                          <a:effectLst/>
+                          <a:latin typeface="+mn-lt"/>
+                          <a:ea typeface="+mn-ea"/>
+                          <a:cs typeface="+mn-cs"/>
+                        </a:rPr>
+                        <a:t>106.705856990563</a:t>
+                      </a:r>
+                      <a:endParaRPr lang="en-US" dirty="0"/>
+                    </a:p>
+                  </a:txBody>
+                  <a:tcPr/>
+                </a:tc>
+              </a:tr>
+              <a:tr h="366218">
+                <a:tc>
+                  <a:txBody>
+                    <a:bodyPr/>
+                    <a:lstStyle/>
+                    <a:p>
+                      <a:pPr algn="ctr"/>
+                      <a:r>
+                        <a:rPr lang="en-US" dirty="0" smtClean="0"/>
+                        <a:t>9</a:t>
+                      </a:r>
+                      <a:endParaRPr lang="en-US" dirty="0"/>
+                    </a:p>
+                  </a:txBody>
+                  <a:tcPr/>
+                </a:tc>
+                <a:tc>
+                  <a:txBody>
+                    <a:bodyPr/>
+                    <a:lstStyle/>
+                    <a:p>
+                      <a:pPr algn="ctr"/>
+                      <a:r>
+                        <a:rPr lang="en-US" sz="1800" b="0" i="0" kern="1200" dirty="0" smtClean="0">
+                          <a:solidFill>
+                            <a:schemeClr val="dk1"/>
+                          </a:solidFill>
+                          <a:effectLst/>
+                          <a:latin typeface="+mn-lt"/>
+                          <a:ea typeface="+mn-ea"/>
+                          <a:cs typeface="+mn-cs"/>
+                        </a:rPr>
+                        <a:t>10.7767894851893</a:t>
+                      </a:r>
+                      <a:endParaRPr lang="en-US" dirty="0"/>
+                    </a:p>
+                  </a:txBody>
+                  <a:tcPr/>
+                </a:tc>
+              </a:tr>
+              <a:tr h="366218">
+                <a:tc>
+                  <a:txBody>
+                    <a:bodyPr/>
+                    <a:lstStyle/>
+                    <a:p>
+                      <a:pPr algn="ctr"/>
+                      <a:r>
+                        <a:rPr lang="en-US" dirty="0" smtClean="0"/>
+                        <a:t>10</a:t>
+                      </a:r>
+                      <a:endParaRPr lang="en-US" dirty="0"/>
+                    </a:p>
+                  </a:txBody>
+                  <a:tcPr/>
+                </a:tc>
+                <a:tc>
+                  <a:txBody>
+                    <a:bodyPr/>
+                    <a:lstStyle/>
+                    <a:p>
+                      <a:pPr algn="ctr"/>
+                      <a:r>
+                        <a:rPr lang="en-US" sz="1800" b="0" i="0" kern="1200" dirty="0" smtClean="0">
+                          <a:solidFill>
+                            <a:schemeClr val="dk1"/>
+                          </a:solidFill>
+                          <a:effectLst/>
+                          <a:latin typeface="+mn-lt"/>
+                          <a:ea typeface="+mn-ea"/>
+                          <a:cs typeface="+mn-cs"/>
+                        </a:rPr>
+                        <a:t>01</a:t>
+                      </a:r>
+                      <a:endParaRPr lang="en-US" dirty="0"/>
+                    </a:p>
+                  </a:txBody>
+                  <a:tcPr/>
+                </a:tc>
+              </a:tr>
+              <a:tr h="366218">
+                <a:tc>
+                  <a:txBody>
+                    <a:bodyPr/>
+                    <a:lstStyle/>
+                    <a:p>
+                      <a:pPr algn="ctr"/>
+                      <a:r>
+                        <a:rPr lang="en-US" dirty="0" smtClean="0"/>
+                        <a:t>11</a:t>
+                      </a:r>
+                      <a:endParaRPr lang="en-US" dirty="0"/>
+                    </a:p>
+                  </a:txBody>
+                  <a:tcPr/>
+                </a:tc>
+                <a:tc>
+                  <a:txBody>
+                    <a:bodyPr/>
+                    <a:lstStyle/>
+                    <a:p>
+                      <a:pPr algn="ctr"/>
+                      <a:r>
+                        <a:rPr lang="en-US" sz="1800" b="0" i="0" kern="1200" dirty="0" err="1" smtClean="0">
+                          <a:solidFill>
+                            <a:schemeClr val="dk1"/>
+                          </a:solidFill>
+                          <a:effectLst/>
+                          <a:latin typeface="+mn-lt"/>
+                          <a:ea typeface="+mn-ea"/>
+                          <a:cs typeface="+mn-cs"/>
+                        </a:rPr>
+                        <a:t>Bến</a:t>
+                      </a:r>
+                      <a:r>
+                        <a:rPr lang="en-US" sz="1800" b="0" i="0" kern="1200" dirty="0" smtClean="0">
+                          <a:solidFill>
+                            <a:schemeClr val="dk1"/>
+                          </a:solidFill>
+                          <a:effectLst/>
+                          <a:latin typeface="+mn-lt"/>
+                          <a:ea typeface="+mn-ea"/>
+                          <a:cs typeface="+mn-cs"/>
+                        </a:rPr>
+                        <a:t> </a:t>
+                      </a:r>
+                      <a:r>
+                        <a:rPr lang="en-US" sz="1800" b="0" i="0" kern="1200" dirty="0" err="1" smtClean="0">
+                          <a:solidFill>
+                            <a:schemeClr val="dk1"/>
+                          </a:solidFill>
+                          <a:effectLst/>
+                          <a:latin typeface="+mn-lt"/>
+                          <a:ea typeface="+mn-ea"/>
+                          <a:cs typeface="+mn-cs"/>
+                        </a:rPr>
+                        <a:t>Thành</a:t>
+                      </a:r>
+                      <a:r>
+                        <a:rPr lang="en-US" sz="1800" b="0" i="0" kern="1200" dirty="0" smtClean="0">
+                          <a:solidFill>
+                            <a:schemeClr val="dk1"/>
+                          </a:solidFill>
+                          <a:effectLst/>
+                          <a:latin typeface="+mn-lt"/>
+                          <a:ea typeface="+mn-ea"/>
+                          <a:cs typeface="+mn-cs"/>
+                        </a:rPr>
+                        <a:t>- BX </a:t>
+                      </a:r>
+                      <a:r>
+                        <a:rPr lang="en-US" sz="1800" b="0" i="0" kern="1200" dirty="0" err="1" smtClean="0">
+                          <a:solidFill>
+                            <a:schemeClr val="dk1"/>
+                          </a:solidFill>
+                          <a:effectLst/>
+                          <a:latin typeface="+mn-lt"/>
+                          <a:ea typeface="+mn-ea"/>
+                          <a:cs typeface="+mn-cs"/>
+                        </a:rPr>
+                        <a:t>Chợ</a:t>
+                      </a:r>
+                      <a:r>
+                        <a:rPr lang="en-US" sz="1800" b="0" i="0" kern="1200" dirty="0" smtClean="0">
+                          <a:solidFill>
+                            <a:schemeClr val="dk1"/>
+                          </a:solidFill>
+                          <a:effectLst/>
+                          <a:latin typeface="+mn-lt"/>
+                          <a:ea typeface="+mn-ea"/>
+                          <a:cs typeface="+mn-cs"/>
+                        </a:rPr>
+                        <a:t> </a:t>
+                      </a:r>
+                      <a:r>
+                        <a:rPr lang="en-US" sz="1800" b="0" i="0" kern="1200" dirty="0" err="1" smtClean="0">
+                          <a:solidFill>
+                            <a:schemeClr val="dk1"/>
+                          </a:solidFill>
+                          <a:effectLst/>
+                          <a:latin typeface="+mn-lt"/>
+                          <a:ea typeface="+mn-ea"/>
+                          <a:cs typeface="+mn-cs"/>
+                        </a:rPr>
+                        <a:t>Lớn</a:t>
+                      </a:r>
+                      <a:endParaRPr lang="en-US" dirty="0"/>
+                    </a:p>
+                  </a:txBody>
+                  <a:tcPr/>
+                </a:tc>
+              </a:tr>
+              <a:tr h="366218">
+                <a:tc>
+                  <a:txBody>
+                    <a:bodyPr/>
+                    <a:lstStyle/>
+                    <a:p>
+                      <a:pPr algn="ctr"/>
+                      <a:r>
+                        <a:rPr lang="en-US" dirty="0" smtClean="0"/>
+                        <a:t>12</a:t>
+                      </a:r>
+                      <a:endParaRPr lang="en-US" dirty="0"/>
+                    </a:p>
+                  </a:txBody>
+                  <a:tcPr/>
+                </a:tc>
+                <a:tc>
+                  <a:txBody>
+                    <a:bodyPr/>
+                    <a:lstStyle/>
+                    <a:p>
+                      <a:pPr algn="ctr"/>
+                      <a:r>
+                        <a:rPr lang="vi-VN" sz="1800" b="0" i="0" kern="1200" dirty="0" smtClean="0">
+                          <a:solidFill>
+                            <a:schemeClr val="dk1"/>
+                          </a:solidFill>
+                          <a:effectLst/>
+                          <a:latin typeface="+mn-lt"/>
+                          <a:ea typeface="+mn-ea"/>
+                          <a:cs typeface="+mn-cs"/>
+                        </a:rPr>
+                        <a:t>Công trường Mê Linh, Thi Sách, Quận 1</a:t>
+                      </a:r>
+                      <a:endParaRPr lang="en-US" dirty="0"/>
+                    </a:p>
+                  </a:txBody>
+                  <a:tcPr/>
+                </a:tc>
+              </a:tr>
+              <a:tr h="366218">
+                <a:tc>
+                  <a:txBody>
+                    <a:bodyPr/>
+                    <a:lstStyle/>
+                    <a:p>
+                      <a:pPr algn="ctr"/>
+                      <a:r>
+                        <a:rPr lang="en-US" dirty="0" smtClean="0"/>
+                        <a:t>13</a:t>
+                      </a:r>
+                      <a:endParaRPr lang="en-US" dirty="0"/>
+                    </a:p>
+                  </a:txBody>
+                  <a:tcPr/>
+                </a:tc>
+                <a:tc>
+                  <a:txBody>
+                    <a:bodyPr/>
+                    <a:lstStyle/>
+                    <a:p>
+                      <a:pPr algn="ctr"/>
+                      <a:r>
+                        <a:rPr lang="en-US" sz="1800" b="0" i="0" kern="1200" dirty="0" smtClean="0">
+                          <a:solidFill>
+                            <a:schemeClr val="dk1"/>
+                          </a:solidFill>
+                          <a:effectLst/>
+                          <a:latin typeface="+mn-lt"/>
+                          <a:ea typeface="+mn-ea"/>
+                          <a:cs typeface="+mn-cs"/>
+                        </a:rPr>
+                        <a:t>BX06</a:t>
+                      </a:r>
+                      <a:endParaRPr lang="en-US" dirty="0"/>
+                    </a:p>
+                  </a:txBody>
+                  <a:tcPr/>
+                </a:tc>
+              </a:tr>
+            </a:tbl>
+          </a:graphicData>
+        </a:graphic>
+      </p:graphicFrame>
+      <p:sp>
+        <p:nvSpPr>
+          <p:cNvPr id="19" name="Rectangle 18"/>
+          <p:cNvSpPr/>
+          <p:nvPr/>
+        </p:nvSpPr>
+        <p:spPr>
+          <a:xfrm>
+            <a:off x="137231" y="6192140"/>
+            <a:ext cx="7490460" cy="369332"/>
+          </a:xfrm>
+          <a:prstGeom prst="rect">
+            <a:avLst/>
+          </a:prstGeom>
+        </p:spPr>
+        <p:txBody>
+          <a:bodyPr wrap="square">
+            <a:spAutoFit/>
+          </a:bodyPr>
+          <a:lstStyle/>
+          <a:p>
+            <a:r>
+              <a:rPr lang="en-US" dirty="0" smtClean="0"/>
+              <a:t>http://mapbus.ebms.vn/ajax.aspx?action=listRouteStations&amp;</a:t>
+            </a:r>
+            <a:r>
+              <a:rPr lang="en-US" dirty="0" smtClean="0">
+                <a:solidFill>
+                  <a:srgbClr val="FF0000"/>
+                </a:solidFill>
+              </a:rPr>
+              <a:t>rid=1</a:t>
+            </a:r>
+            <a:r>
+              <a:rPr lang="en-US" dirty="0" smtClean="0"/>
+              <a:t>&amp;</a:t>
+            </a:r>
+            <a:r>
+              <a:rPr lang="en-US" dirty="0" smtClean="0">
+                <a:solidFill>
+                  <a:srgbClr val="FF0000"/>
+                </a:solidFill>
+              </a:rPr>
+              <a:t>isgo=true</a:t>
+            </a:r>
+            <a:endParaRPr lang="en-US" dirty="0">
+              <a:solidFill>
+                <a:srgbClr val="FF0000"/>
+              </a:solidFill>
+            </a:endParaRPr>
+          </a:p>
+        </p:txBody>
+      </p:sp>
+      <p:pic>
+        <p:nvPicPr>
+          <p:cNvPr id="20" name="Picture 19"/>
+          <p:cNvPicPr>
+            <a:picLocks noChangeAspect="1"/>
+          </p:cNvPicPr>
+          <p:nvPr/>
+        </p:nvPicPr>
+        <p:blipFill>
+          <a:blip r:embed="rId2">
+            <a:extLst>
+              <a:ext uri="{28A0092B-C50C-407E-A947-70E740481C1C}">
+                <a14:useLocalDpi xmlns:a14="http://schemas.microsoft.com/office/drawing/2010/main" val="0"/>
+              </a:ext>
+            </a:extLst>
+          </a:blip>
+          <a:stretch>
+            <a:fillRect/>
+          </a:stretch>
+        </p:blipFill>
+        <p:spPr>
+          <a:xfrm>
+            <a:off x="6871959" y="2265882"/>
+            <a:ext cx="2130741" cy="3926258"/>
+          </a:xfrm>
+          <a:prstGeom prst="rect">
+            <a:avLst/>
+          </a:prstGeom>
+        </p:spPr>
+      </p:pic>
+      <p:graphicFrame>
+        <p:nvGraphicFramePr>
+          <p:cNvPr id="21" name="Table 20"/>
+          <p:cNvGraphicFramePr>
+            <a:graphicFrameLocks noGrp="1"/>
+          </p:cNvGraphicFramePr>
+          <p:nvPr>
+            <p:extLst>
+              <p:ext uri="{D42A27DB-BD31-4B8C-83A1-F6EECF244321}">
+                <p14:modId xmlns:p14="http://schemas.microsoft.com/office/powerpoint/2010/main" val="4272062364"/>
+              </p:ext>
+            </p:extLst>
+          </p:nvPr>
+        </p:nvGraphicFramePr>
+        <p:xfrm>
+          <a:off x="6650407" y="75488"/>
+          <a:ext cx="1808861" cy="1005840"/>
+        </p:xfrm>
+        <a:graphic>
+          <a:graphicData uri="http://schemas.openxmlformats.org/drawingml/2006/table">
+            <a:tbl>
+              <a:tblPr firstRow="1" bandRow="1">
+                <a:tableStyleId>{21E4AEA4-8DFA-4A89-87EB-49C32662AFE0}</a:tableStyleId>
+              </a:tblPr>
+              <a:tblGrid>
+                <a:gridCol w="1808861"/>
+              </a:tblGrid>
+              <a:tr h="310682">
+                <a:tc>
+                  <a:txBody>
+                    <a:bodyPr/>
+                    <a:lstStyle/>
+                    <a:p>
+                      <a:pPr algn="ctr"/>
+                      <a:r>
+                        <a:rPr lang="en-US" sz="1600" dirty="0" err="1" smtClean="0">
+                          <a:latin typeface="Cambria" panose="02040503050406030204" pitchFamily="18" charset="0"/>
+                        </a:rPr>
+                        <a:t>PathInfo</a:t>
+                      </a:r>
+                      <a:endParaRPr lang="en-US" sz="1600" dirty="0">
+                        <a:latin typeface="Cambria" panose="02040503050406030204" pitchFamily="18" charset="0"/>
+                      </a:endParaRPr>
+                    </a:p>
+                  </a:txBody>
+                  <a:tcPr/>
+                </a:tc>
+              </a:tr>
+              <a:tr h="300814">
+                <a:tc>
+                  <a:txBody>
+                    <a:bodyPr/>
+                    <a:lstStyle/>
+                    <a:p>
+                      <a:pPr marL="0" marR="0" indent="0" algn="l" defTabSz="914400" rtl="0" eaLnBrk="1" fontAlgn="auto" latinLnBrk="0" hangingPunct="1">
+                        <a:lnSpc>
+                          <a:spcPct val="100000"/>
+                        </a:lnSpc>
+                        <a:spcBef>
+                          <a:spcPts val="0"/>
+                        </a:spcBef>
+                        <a:spcAft>
+                          <a:spcPts val="0"/>
+                        </a:spcAft>
+                        <a:buClrTx/>
+                        <a:buSzTx/>
+                        <a:buFontTx/>
+                        <a:buNone/>
+                        <a:tabLst/>
+                        <a:defRPr/>
+                      </a:pPr>
+                      <a:r>
+                        <a:rPr lang="en-US" sz="1600" dirty="0" err="1" smtClean="0">
+                          <a:latin typeface="Cambria" panose="02040503050406030204" pitchFamily="18" charset="0"/>
+                        </a:rPr>
+                        <a:t>PahtInfoNo</a:t>
+                      </a:r>
+                      <a:endParaRPr lang="en-US" sz="1600" dirty="0" smtClean="0">
+                        <a:latin typeface="Cambria" panose="02040503050406030204" pitchFamily="18" charset="0"/>
+                      </a:endParaRPr>
+                    </a:p>
+                  </a:txBody>
+                  <a:tcPr/>
+                </a:tc>
+              </a:tr>
+              <a:tr h="300814">
+                <a:tc>
+                  <a:txBody>
+                    <a:bodyPr/>
+                    <a:lstStyle/>
+                    <a:p>
+                      <a:pPr marL="0" marR="0" indent="0" algn="l" defTabSz="914400" rtl="0" eaLnBrk="1" fontAlgn="auto" latinLnBrk="0" hangingPunct="1">
+                        <a:lnSpc>
+                          <a:spcPct val="100000"/>
+                        </a:lnSpc>
+                        <a:spcBef>
+                          <a:spcPts val="0"/>
+                        </a:spcBef>
+                        <a:spcAft>
+                          <a:spcPts val="0"/>
+                        </a:spcAft>
+                        <a:buClrTx/>
+                        <a:buSzTx/>
+                        <a:buFontTx/>
+                        <a:buNone/>
+                        <a:tabLst/>
+                        <a:defRPr/>
+                      </a:pPr>
+                      <a:r>
+                        <a:rPr lang="en-US" sz="1600" dirty="0" err="1" smtClean="0">
+                          <a:latin typeface="Cambria" panose="02040503050406030204" pitchFamily="18" charset="0"/>
+                        </a:rPr>
+                        <a:t>MiddlePoints</a:t>
+                      </a:r>
+                      <a:endParaRPr lang="en-US" sz="1600" dirty="0" smtClean="0">
+                        <a:latin typeface="Cambria" panose="02040503050406030204" pitchFamily="18" charset="0"/>
+                      </a:endParaRPr>
+                    </a:p>
+                  </a:txBody>
+                  <a:tcPr/>
+                </a:tc>
+              </a:tr>
+            </a:tbl>
+          </a:graphicData>
+        </a:graphic>
+      </p:graphicFrame>
+      <p:cxnSp>
+        <p:nvCxnSpPr>
+          <p:cNvPr id="22" name="Straight Arrow Connector 21"/>
+          <p:cNvCxnSpPr/>
+          <p:nvPr/>
+        </p:nvCxnSpPr>
+        <p:spPr>
+          <a:xfrm flipV="1">
+            <a:off x="5631679" y="934720"/>
+            <a:ext cx="1084081" cy="817169"/>
+          </a:xfrm>
+          <a:prstGeom prst="straightConnector1">
+            <a:avLst/>
+          </a:prstGeom>
+          <a:ln>
+            <a:tailEnd type="triangle"/>
+          </a:ln>
+        </p:spPr>
+        <p:style>
+          <a:lnRef idx="3">
+            <a:schemeClr val="accent2"/>
+          </a:lnRef>
+          <a:fillRef idx="0">
+            <a:schemeClr val="accent2"/>
+          </a:fillRef>
+          <a:effectRef idx="2">
+            <a:schemeClr val="accent2"/>
+          </a:effectRef>
+          <a:fontRef idx="minor">
+            <a:schemeClr val="tx1"/>
+          </a:fontRef>
+        </p:style>
+      </p:cxnSp>
+      <p:sp>
+        <p:nvSpPr>
+          <p:cNvPr id="23" name="Diamond 22"/>
+          <p:cNvSpPr/>
+          <p:nvPr/>
+        </p:nvSpPr>
+        <p:spPr>
+          <a:xfrm>
+            <a:off x="7424871" y="2656318"/>
+            <a:ext cx="119641" cy="102549"/>
+          </a:xfrm>
+          <a:prstGeom prst="diamond">
+            <a:avLst/>
+          </a:prstGeom>
+          <a:solidFill>
+            <a:srgbClr val="FF0000"/>
+          </a:solidFill>
+        </p:spPr>
+        <p:style>
+          <a:lnRef idx="2">
+            <a:schemeClr val="accent2">
+              <a:shade val="50000"/>
+            </a:schemeClr>
+          </a:lnRef>
+          <a:fillRef idx="1">
+            <a:schemeClr val="accent2"/>
+          </a:fillRef>
+          <a:effectRef idx="0">
+            <a:schemeClr val="accent2"/>
+          </a:effectRef>
+          <a:fontRef idx="minor">
+            <a:schemeClr val="lt1"/>
+          </a:fontRef>
+        </p:style>
+        <p:txBody>
+          <a:bodyPr rtlCol="0" anchor="ctr"/>
+          <a:lstStyle/>
+          <a:p>
+            <a:pPr algn="ctr"/>
+            <a:endParaRPr lang="en-US"/>
+          </a:p>
+        </p:txBody>
+      </p:sp>
+      <p:sp>
+        <p:nvSpPr>
+          <p:cNvPr id="24" name="Diamond 23"/>
+          <p:cNvSpPr/>
+          <p:nvPr/>
+        </p:nvSpPr>
+        <p:spPr>
+          <a:xfrm>
+            <a:off x="7544512" y="2881932"/>
+            <a:ext cx="119641" cy="102549"/>
+          </a:xfrm>
+          <a:prstGeom prst="diamond">
+            <a:avLst/>
+          </a:prstGeom>
+          <a:solidFill>
+            <a:srgbClr val="FF0000"/>
+          </a:solidFill>
+        </p:spPr>
+        <p:style>
+          <a:lnRef idx="2">
+            <a:schemeClr val="accent2">
+              <a:shade val="50000"/>
+            </a:schemeClr>
+          </a:lnRef>
+          <a:fillRef idx="1">
+            <a:schemeClr val="accent2"/>
+          </a:fillRef>
+          <a:effectRef idx="0">
+            <a:schemeClr val="accent2"/>
+          </a:effectRef>
+          <a:fontRef idx="minor">
+            <a:schemeClr val="lt1"/>
+          </a:fontRef>
+        </p:style>
+        <p:txBody>
+          <a:bodyPr rtlCol="0" anchor="ctr"/>
+          <a:lstStyle/>
+          <a:p>
+            <a:pPr algn="ctr"/>
+            <a:endParaRPr lang="en-US"/>
+          </a:p>
+        </p:txBody>
+      </p:sp>
+      <p:sp>
+        <p:nvSpPr>
+          <p:cNvPr id="25" name="Diamond 24"/>
+          <p:cNvSpPr/>
+          <p:nvPr/>
+        </p:nvSpPr>
+        <p:spPr>
+          <a:xfrm>
+            <a:off x="7664153" y="3245978"/>
+            <a:ext cx="119641" cy="102549"/>
+          </a:xfrm>
+          <a:prstGeom prst="diamond">
+            <a:avLst/>
+          </a:prstGeom>
+          <a:solidFill>
+            <a:srgbClr val="FF0000"/>
+          </a:solidFill>
+        </p:spPr>
+        <p:style>
+          <a:lnRef idx="2">
+            <a:schemeClr val="accent2">
+              <a:shade val="50000"/>
+            </a:schemeClr>
+          </a:lnRef>
+          <a:fillRef idx="1">
+            <a:schemeClr val="accent2"/>
+          </a:fillRef>
+          <a:effectRef idx="0">
+            <a:schemeClr val="accent2"/>
+          </a:effectRef>
+          <a:fontRef idx="minor">
+            <a:schemeClr val="lt1"/>
+          </a:fontRef>
+        </p:style>
+        <p:txBody>
+          <a:bodyPr rtlCol="0" anchor="ctr"/>
+          <a:lstStyle/>
+          <a:p>
+            <a:pPr algn="ctr"/>
+            <a:endParaRPr lang="en-US"/>
+          </a:p>
+        </p:txBody>
+      </p:sp>
+      <p:sp>
+        <p:nvSpPr>
+          <p:cNvPr id="26" name="Diamond 25"/>
+          <p:cNvSpPr/>
+          <p:nvPr/>
+        </p:nvSpPr>
+        <p:spPr>
+          <a:xfrm>
+            <a:off x="7484691" y="3664722"/>
+            <a:ext cx="119641" cy="102549"/>
+          </a:xfrm>
+          <a:prstGeom prst="diamond">
+            <a:avLst/>
+          </a:prstGeom>
+          <a:solidFill>
+            <a:srgbClr val="FF0000"/>
+          </a:solidFill>
+        </p:spPr>
+        <p:style>
+          <a:lnRef idx="2">
+            <a:schemeClr val="accent2">
+              <a:shade val="50000"/>
+            </a:schemeClr>
+          </a:lnRef>
+          <a:fillRef idx="1">
+            <a:schemeClr val="accent2"/>
+          </a:fillRef>
+          <a:effectRef idx="0">
+            <a:schemeClr val="accent2"/>
+          </a:effectRef>
+          <a:fontRef idx="minor">
+            <a:schemeClr val="lt1"/>
+          </a:fontRef>
+        </p:style>
+        <p:txBody>
+          <a:bodyPr rtlCol="0" anchor="ctr"/>
+          <a:lstStyle/>
+          <a:p>
+            <a:pPr algn="ctr"/>
+            <a:endParaRPr lang="en-US"/>
+          </a:p>
+        </p:txBody>
+      </p:sp>
+      <p:sp>
+        <p:nvSpPr>
+          <p:cNvPr id="27" name="Diamond 26"/>
+          <p:cNvSpPr/>
+          <p:nvPr/>
+        </p:nvSpPr>
+        <p:spPr>
+          <a:xfrm>
+            <a:off x="7484691" y="4198547"/>
+            <a:ext cx="119641" cy="102549"/>
+          </a:xfrm>
+          <a:prstGeom prst="diamond">
+            <a:avLst/>
+          </a:prstGeom>
+          <a:solidFill>
+            <a:srgbClr val="FF0000"/>
+          </a:solidFill>
+        </p:spPr>
+        <p:style>
+          <a:lnRef idx="2">
+            <a:schemeClr val="accent2">
+              <a:shade val="50000"/>
+            </a:schemeClr>
+          </a:lnRef>
+          <a:fillRef idx="1">
+            <a:schemeClr val="accent2"/>
+          </a:fillRef>
+          <a:effectRef idx="0">
+            <a:schemeClr val="accent2"/>
+          </a:effectRef>
+          <a:fontRef idx="minor">
+            <a:schemeClr val="lt1"/>
+          </a:fontRef>
+        </p:style>
+        <p:txBody>
+          <a:bodyPr rtlCol="0" anchor="ctr"/>
+          <a:lstStyle/>
+          <a:p>
+            <a:pPr algn="ctr"/>
+            <a:endParaRPr lang="en-US"/>
+          </a:p>
+        </p:txBody>
+      </p:sp>
+      <p:sp>
+        <p:nvSpPr>
+          <p:cNvPr id="28" name="Diamond 27"/>
+          <p:cNvSpPr/>
+          <p:nvPr/>
+        </p:nvSpPr>
+        <p:spPr>
+          <a:xfrm>
+            <a:off x="7877508" y="4408206"/>
+            <a:ext cx="119641" cy="102549"/>
+          </a:xfrm>
+          <a:prstGeom prst="diamond">
+            <a:avLst/>
+          </a:prstGeom>
+          <a:solidFill>
+            <a:srgbClr val="FF0000"/>
+          </a:solidFill>
+        </p:spPr>
+        <p:style>
+          <a:lnRef idx="2">
+            <a:schemeClr val="accent2">
+              <a:shade val="50000"/>
+            </a:schemeClr>
+          </a:lnRef>
+          <a:fillRef idx="1">
+            <a:schemeClr val="accent2"/>
+          </a:fillRef>
+          <a:effectRef idx="0">
+            <a:schemeClr val="accent2"/>
+          </a:effectRef>
+          <a:fontRef idx="minor">
+            <a:schemeClr val="lt1"/>
+          </a:fontRef>
+        </p:style>
+        <p:txBody>
+          <a:bodyPr rtlCol="0" anchor="ctr"/>
+          <a:lstStyle/>
+          <a:p>
+            <a:pPr algn="ctr"/>
+            <a:endParaRPr lang="en-US"/>
+          </a:p>
+        </p:txBody>
+      </p:sp>
+      <p:sp>
+        <p:nvSpPr>
+          <p:cNvPr id="29" name="Diamond 28"/>
+          <p:cNvSpPr/>
+          <p:nvPr/>
+        </p:nvSpPr>
+        <p:spPr>
+          <a:xfrm>
+            <a:off x="7997149" y="4920954"/>
+            <a:ext cx="119641" cy="102549"/>
+          </a:xfrm>
+          <a:prstGeom prst="diamond">
+            <a:avLst/>
+          </a:prstGeom>
+          <a:solidFill>
+            <a:srgbClr val="FF0000"/>
+          </a:solidFill>
+        </p:spPr>
+        <p:style>
+          <a:lnRef idx="2">
+            <a:schemeClr val="accent2">
+              <a:shade val="50000"/>
+            </a:schemeClr>
+          </a:lnRef>
+          <a:fillRef idx="1">
+            <a:schemeClr val="accent2"/>
+          </a:fillRef>
+          <a:effectRef idx="0">
+            <a:schemeClr val="accent2"/>
+          </a:effectRef>
+          <a:fontRef idx="minor">
+            <a:schemeClr val="lt1"/>
+          </a:fontRef>
+        </p:style>
+        <p:txBody>
+          <a:bodyPr rtlCol="0" anchor="ctr"/>
+          <a:lstStyle/>
+          <a:p>
+            <a:pPr algn="ctr"/>
+            <a:endParaRPr lang="en-US"/>
+          </a:p>
+        </p:txBody>
+      </p:sp>
+      <p:sp>
+        <p:nvSpPr>
+          <p:cNvPr id="30" name="Diamond 29"/>
+          <p:cNvSpPr/>
+          <p:nvPr/>
+        </p:nvSpPr>
+        <p:spPr>
+          <a:xfrm>
+            <a:off x="7937328" y="5382427"/>
+            <a:ext cx="119641" cy="102549"/>
+          </a:xfrm>
+          <a:prstGeom prst="diamond">
+            <a:avLst/>
+          </a:prstGeom>
+          <a:solidFill>
+            <a:srgbClr val="FF0000"/>
+          </a:solidFill>
+        </p:spPr>
+        <p:style>
+          <a:lnRef idx="2">
+            <a:schemeClr val="accent2">
+              <a:shade val="50000"/>
+            </a:schemeClr>
+          </a:lnRef>
+          <a:fillRef idx="1">
+            <a:schemeClr val="accent2"/>
+          </a:fillRef>
+          <a:effectRef idx="0">
+            <a:schemeClr val="accent2"/>
+          </a:effectRef>
+          <a:fontRef idx="minor">
+            <a:schemeClr val="lt1"/>
+          </a:fontRef>
+        </p:style>
+        <p:txBody>
+          <a:bodyPr rtlCol="0" anchor="ctr"/>
+          <a:lstStyle/>
+          <a:p>
+            <a:pPr algn="ctr"/>
+            <a:endParaRPr lang="en-US"/>
+          </a:p>
+        </p:txBody>
+      </p:sp>
+      <p:cxnSp>
+        <p:nvCxnSpPr>
+          <p:cNvPr id="31" name="Straight Arrow Connector 30"/>
+          <p:cNvCxnSpPr>
+            <a:endCxn id="24" idx="1"/>
+          </p:cNvCxnSpPr>
+          <p:nvPr/>
+        </p:nvCxnSpPr>
+        <p:spPr>
+          <a:xfrm>
+            <a:off x="5247118" y="2265882"/>
+            <a:ext cx="2297394" cy="667325"/>
+          </a:xfrm>
+          <a:prstGeom prst="straightConnector1">
+            <a:avLst/>
+          </a:prstGeom>
+          <a:ln>
+            <a:tailEnd type="triangle"/>
+          </a:ln>
+        </p:spPr>
+        <p:style>
+          <a:lnRef idx="3">
+            <a:schemeClr val="accent2"/>
+          </a:lnRef>
+          <a:fillRef idx="0">
+            <a:schemeClr val="accent2"/>
+          </a:fillRef>
+          <a:effectRef idx="2">
+            <a:schemeClr val="accent2"/>
+          </a:effectRef>
+          <a:fontRef idx="minor">
+            <a:schemeClr val="tx1"/>
+          </a:fontRef>
+        </p:style>
+      </p:cxnSp>
+    </p:spTree>
+    <p:extLst>
+      <p:ext uri="{BB962C8B-B14F-4D97-AF65-F5344CB8AC3E}">
+        <p14:creationId xmlns:p14="http://schemas.microsoft.com/office/powerpoint/2010/main" val="1249556590"/>
+      </p:ext>
+    </p:extLst>
+  </p:cSld>
+  <p:clrMapOvr>
+    <a:masterClrMapping/>
+  </p:clrMapOvr>
+</p:sld>
+</file>
+
+<file path=ppt/slides/slide18.xml><?xml version="1.0" encoding="utf-8"?>
 <p:sld xmlns:a="http://schemas.openxmlformats.org/drawingml/2006/main" xmlns:r="http://schemas.openxmlformats.org/officeDocument/2006/relationships" xmlns:p="http://schemas.openxmlformats.org/presentationml/2006/main">
   <p:cSld>
     <p:spTree>
@@ -8111,7 +9444,7 @@
 </p:sld>
 </file>
 
-<file path=ppt/slides/slide18.xml><?xml version="1.0" encoding="utf-8"?>
+<file path=ppt/slides/slide19.xml><?xml version="1.0" encoding="utf-8"?>
 <p:sld xmlns:a="http://schemas.openxmlformats.org/drawingml/2006/main" xmlns:r="http://schemas.openxmlformats.org/officeDocument/2006/relationships" xmlns:p="http://schemas.openxmlformats.org/presentationml/2006/main">
   <p:cSld>
     <p:spTree>
@@ -8289,13 +9622,13 @@
           <p:nvPr>
             <p:extLst>
               <p:ext uri="{D42A27DB-BD31-4B8C-83A1-F6EECF244321}">
-                <p14:modId xmlns:p14="http://schemas.microsoft.com/office/powerpoint/2010/main" val="2442890561"/>
+                <p14:modId xmlns:p14="http://schemas.microsoft.com/office/powerpoint/2010/main" val="1628734403"/>
               </p:ext>
             </p:extLst>
           </p:nvPr>
         </p:nvGraphicFramePr>
         <p:xfrm>
-          <a:off x="488962" y="1963195"/>
+          <a:off x="488962" y="2125755"/>
           <a:ext cx="1440679" cy="1450719"/>
         </p:xfrm>
         <a:graphic>
@@ -8401,14 +9734,14 @@
           <p:nvPr>
             <p:extLst>
               <p:ext uri="{D42A27DB-BD31-4B8C-83A1-F6EECF244321}">
-                <p14:modId xmlns:p14="http://schemas.microsoft.com/office/powerpoint/2010/main" val="954914558"/>
+                <p14:modId xmlns:p14="http://schemas.microsoft.com/office/powerpoint/2010/main" val="2299441195"/>
               </p:ext>
             </p:extLst>
           </p:nvPr>
         </p:nvGraphicFramePr>
         <p:xfrm>
           <a:off x="3334639" y="1858929"/>
-          <a:ext cx="1808861" cy="1676400"/>
+          <a:ext cx="1808861" cy="2011680"/>
         </p:xfrm>
         <a:graphic>
           <a:graphicData uri="http://schemas.openxmlformats.org/drawingml/2006/table">
@@ -8571,6 +9904,43 @@
                   <a:tcPr/>
                 </a:tc>
               </a:tr>
+              <a:tr h="300814">
+                <a:tc>
+                  <a:txBody>
+                    <a:bodyPr/>
+                    <a:lstStyle/>
+                    <a:p>
+                      <a:pPr marL="0" marR="0" indent="0" algn="l" defTabSz="914400" rtl="0" eaLnBrk="1" fontAlgn="auto" latinLnBrk="0" hangingPunct="1">
+                        <a:lnSpc>
+                          <a:spcPct val="100000"/>
+                        </a:lnSpc>
+                        <a:spcBef>
+                          <a:spcPts val="0"/>
+                        </a:spcBef>
+                        <a:spcAft>
+                          <a:spcPts val="0"/>
+                        </a:spcAft>
+                        <a:buClrTx/>
+                        <a:buSzTx/>
+                        <a:buFontTx/>
+                        <a:buNone/>
+                        <a:tabLst/>
+                        <a:defRPr/>
+                      </a:pPr>
+                      <a:r>
+                        <a:rPr lang="en-US" sz="1600" dirty="0" err="1" smtClean="0">
+                          <a:latin typeface="Cambria" panose="02040503050406030204" pitchFamily="18" charset="0"/>
+                        </a:rPr>
+                        <a:t>MiddlePoints</a:t>
+                      </a:r>
+                      <a:endParaRPr lang="en-US" sz="1600" dirty="0" smtClean="0">
+                        <a:latin typeface="Cambria" panose="02040503050406030204" pitchFamily="18" charset="0"/>
+                      </a:endParaRPr>
+                    </a:p>
+                  </a:txBody>
+                  <a:tcPr/>
+                </a:tc>
+              </a:tr>
             </a:tbl>
           </a:graphicData>
         </a:graphic>
@@ -8586,8 +9956,8 @@
         </p:nvCxnSpPr>
         <p:spPr>
           <a:xfrm>
-            <a:off x="1929641" y="2688554"/>
-            <a:ext cx="1404998" cy="8575"/>
+            <a:off x="1929641" y="2851114"/>
+            <a:ext cx="1404998" cy="13655"/>
           </a:xfrm>
           <a:prstGeom prst="line">
             <a:avLst/>
@@ -8676,7 +10046,7 @@
         </p:nvSpPr>
         <p:spPr>
           <a:xfrm>
-            <a:off x="1852729" y="2372736"/>
+            <a:off x="1858541" y="2537740"/>
             <a:ext cx="301686" cy="369332"/>
           </a:xfrm>
           <a:prstGeom prst="rect">
@@ -8836,7 +10206,7 @@
             </p:nvSpPr>
             <p:spPr>
               <a:xfrm>
-                <a:off x="3100578" y="2459930"/>
+                <a:off x="3103380" y="2621596"/>
                 <a:ext cx="248465" cy="276999"/>
               </a:xfrm>
               <a:prstGeom prst="rect">
@@ -8883,7 +10253,7 @@
             </p:nvSpPr>
             <p:spPr>
               <a:xfrm>
-                <a:off x="3100578" y="2459930"/>
+                <a:off x="3103380" y="2621596"/>
                 <a:ext cx="248465" cy="276999"/>
               </a:xfrm>
               <a:prstGeom prst="rect">
@@ -8892,7 +10262,7 @@
               <a:blipFill rotWithShape="0">
                 <a:blip r:embed="rId2"/>
                 <a:stretch>
-                  <a:fillRect l="-15000" r="-12500"/>
+                  <a:fillRect l="-12195" r="-12195"/>
                 </a:stretch>
               </a:blipFill>
             </p:spPr>
@@ -9089,7 +10459,7 @@
         </p:nvSpPr>
         <p:spPr>
           <a:xfrm>
-            <a:off x="2180221" y="2405217"/>
+            <a:off x="2148311" y="2567652"/>
             <a:ext cx="917239" cy="338554"/>
           </a:xfrm>
           <a:prstGeom prst="rect">
@@ -9119,1440 +10489,6 @@
     <p:extLst>
       <p:ext uri="{BB962C8B-B14F-4D97-AF65-F5344CB8AC3E}">
         <p14:creationId xmlns:p14="http://schemas.microsoft.com/office/powerpoint/2010/main" val="3767814212"/>
-      </p:ext>
-    </p:extLst>
-  </p:cSld>
-  <p:clrMapOvr>
-    <a:masterClrMapping/>
-  </p:clrMapOvr>
-  <p:timing>
-    <p:tnLst>
-      <p:par>
-        <p:cTn id="1" dur="indefinite" restart="never" nodeType="tmRoot"/>
-      </p:par>
-    </p:tnLst>
-  </p:timing>
-</p:sld>
-</file>
-
-<file path=ppt/slides/slide19.xml><?xml version="1.0" encoding="utf-8"?>
-<p:sld xmlns:a="http://schemas.openxmlformats.org/drawingml/2006/main" xmlns:r="http://schemas.openxmlformats.org/officeDocument/2006/relationships" xmlns:p="http://schemas.openxmlformats.org/presentationml/2006/main">
-  <p:cSld>
-    <p:spTree>
-      <p:nvGrpSpPr>
-        <p:cNvPr id="1" name=""/>
-        <p:cNvGrpSpPr/>
-        <p:nvPr/>
-      </p:nvGrpSpPr>
-      <p:grpSpPr>
-        <a:xfrm>
-          <a:off x="0" y="0"/>
-          <a:ext cx="0" cy="0"/>
-          <a:chOff x="0" y="0"/>
-          <a:chExt cx="0" cy="0"/>
-        </a:xfrm>
-      </p:grpSpPr>
-      <p:graphicFrame>
-        <p:nvGraphicFramePr>
-          <p:cNvPr id="4" name="Table 3"/>
-          <p:cNvGraphicFramePr>
-            <a:graphicFrameLocks noGrp="1"/>
-          </p:cNvGraphicFramePr>
-          <p:nvPr>
-            <p:extLst>
-              <p:ext uri="{D42A27DB-BD31-4B8C-83A1-F6EECF244321}">
-                <p14:modId xmlns:p14="http://schemas.microsoft.com/office/powerpoint/2010/main" val="3616197222"/>
-              </p:ext>
-            </p:extLst>
-          </p:nvPr>
-        </p:nvGraphicFramePr>
-        <p:xfrm>
-          <a:off x="137159" y="76914"/>
-          <a:ext cx="5742347" cy="5978623"/>
-        </p:xfrm>
-        <a:graphic>
-          <a:graphicData uri="http://schemas.openxmlformats.org/drawingml/2006/table">
-            <a:tbl>
-              <a:tblPr firstRow="1" bandRow="1">
-                <a:tableStyleId>{5C22544A-7EE6-4342-B048-85BDC9FD1C3A}</a:tableStyleId>
-              </a:tblPr>
-              <a:tblGrid>
-                <a:gridCol w="754659"/>
-                <a:gridCol w="4987688"/>
-              </a:tblGrid>
-              <a:tr h="394829">
-                <a:tc>
-                  <a:txBody>
-                    <a:bodyPr/>
-                    <a:lstStyle/>
-                    <a:p>
-                      <a:pPr algn="ctr"/>
-                      <a:r>
-                        <a:rPr lang="en-US" sz="1600" dirty="0" smtClean="0"/>
-                        <a:t>Index</a:t>
-                      </a:r>
-                      <a:endParaRPr lang="en-US" sz="1600" dirty="0"/>
-                    </a:p>
-                  </a:txBody>
-                  <a:tcPr/>
-                </a:tc>
-                <a:tc>
-                  <a:txBody>
-                    <a:bodyPr/>
-                    <a:lstStyle/>
-                    <a:p>
-                      <a:pPr algn="ctr"/>
-                      <a:r>
-                        <a:rPr lang="en-US" dirty="0" smtClean="0"/>
-                        <a:t>Sample value</a:t>
-                      </a:r>
-                      <a:endParaRPr lang="en-US" dirty="0"/>
-                    </a:p>
-                  </a:txBody>
-                  <a:tcPr/>
-                </a:tc>
-              </a:tr>
-              <a:tr h="366218">
-                <a:tc>
-                  <a:txBody>
-                    <a:bodyPr/>
-                    <a:lstStyle/>
-                    <a:p>
-                      <a:pPr algn="ctr"/>
-                      <a:r>
-                        <a:rPr lang="en-US" dirty="0" smtClean="0"/>
-                        <a:t>0</a:t>
-                      </a:r>
-                      <a:endParaRPr lang="en-US" dirty="0"/>
-                    </a:p>
-                  </a:txBody>
-                  <a:tcPr/>
-                </a:tc>
-                <a:tc>
-                  <a:txBody>
-                    <a:bodyPr/>
-                    <a:lstStyle/>
-                    <a:p>
-                      <a:pPr algn="ctr"/>
-                      <a:r>
-                        <a:rPr lang="en-US" dirty="0" smtClean="0"/>
-                        <a:t>1</a:t>
-                      </a:r>
-                      <a:endParaRPr lang="en-US" dirty="0"/>
-                    </a:p>
-                  </a:txBody>
-                  <a:tcPr/>
-                </a:tc>
-              </a:tr>
-              <a:tr h="366218">
-                <a:tc>
-                  <a:txBody>
-                    <a:bodyPr/>
-                    <a:lstStyle/>
-                    <a:p>
-                      <a:pPr algn="ctr"/>
-                      <a:r>
-                        <a:rPr lang="en-US" dirty="0" smtClean="0"/>
-                        <a:t>1</a:t>
-                      </a:r>
-                      <a:endParaRPr lang="en-US" dirty="0"/>
-                    </a:p>
-                  </a:txBody>
-                  <a:tcPr/>
-                </a:tc>
-                <a:tc>
-                  <a:txBody>
-                    <a:bodyPr/>
-                    <a:lstStyle/>
-                    <a:p>
-                      <a:pPr algn="ctr"/>
-                      <a:r>
-                        <a:rPr lang="en-US" dirty="0" smtClean="0"/>
-                        <a:t>8999</a:t>
-                      </a:r>
-                      <a:endParaRPr lang="en-US" dirty="0"/>
-                    </a:p>
-                  </a:txBody>
-                  <a:tcPr/>
-                </a:tc>
-              </a:tr>
-              <a:tr h="366218">
-                <a:tc>
-                  <a:txBody>
-                    <a:bodyPr/>
-                    <a:lstStyle/>
-                    <a:p>
-                      <a:pPr algn="ctr"/>
-                      <a:r>
-                        <a:rPr lang="en-US" dirty="0" smtClean="0"/>
-                        <a:t>2</a:t>
-                      </a:r>
-                      <a:endParaRPr lang="en-US" dirty="0"/>
-                    </a:p>
-                  </a:txBody>
-                  <a:tcPr/>
-                </a:tc>
-                <a:tc>
-                  <a:txBody>
-                    <a:bodyPr/>
-                    <a:lstStyle/>
-                    <a:p>
-                      <a:pPr algn="ctr"/>
-                      <a:r>
-                        <a:rPr lang="en-US" dirty="0" smtClean="0"/>
-                        <a:t>8994</a:t>
-                      </a:r>
-                      <a:endParaRPr lang="en-US" dirty="0"/>
-                    </a:p>
-                  </a:txBody>
-                  <a:tcPr/>
-                </a:tc>
-              </a:tr>
-              <a:tr h="366218">
-                <a:tc>
-                  <a:txBody>
-                    <a:bodyPr/>
-                    <a:lstStyle/>
-                    <a:p>
-                      <a:pPr algn="ctr"/>
-                      <a:r>
-                        <a:rPr lang="en-US" dirty="0" smtClean="0"/>
-                        <a:t>3</a:t>
-                      </a:r>
-                      <a:endParaRPr lang="en-US" dirty="0"/>
-                    </a:p>
-                  </a:txBody>
-                  <a:tcPr/>
-                </a:tc>
-                <a:tc>
-                  <a:txBody>
-                    <a:bodyPr/>
-                    <a:lstStyle/>
-                    <a:p>
-                      <a:pPr marL="0" marR="0" indent="0" algn="ctr" defTabSz="914400" rtl="0" eaLnBrk="1" fontAlgn="auto" latinLnBrk="0" hangingPunct="1">
-                        <a:lnSpc>
-                          <a:spcPct val="100000"/>
-                        </a:lnSpc>
-                        <a:spcBef>
-                          <a:spcPts val="0"/>
-                        </a:spcBef>
-                        <a:spcAft>
-                          <a:spcPts val="0"/>
-                        </a:spcAft>
-                        <a:buClrTx/>
-                        <a:buSzTx/>
-                        <a:buFontTx/>
-                        <a:buNone/>
-                        <a:tabLst/>
-                        <a:defRPr/>
-                      </a:pPr>
-                      <a:r>
-                        <a:rPr lang="en-US" sz="1600" b="0" i="0" kern="1200" dirty="0" smtClean="0">
-                          <a:solidFill>
-                            <a:schemeClr val="dk1"/>
-                          </a:solidFill>
-                          <a:effectLst/>
-                          <a:latin typeface="Cambria" panose="02040503050406030204" pitchFamily="18" charset="0"/>
-                          <a:ea typeface="+mn-ea"/>
-                          <a:cs typeface="+mn-cs"/>
-                        </a:rPr>
-                        <a:t>106.70589000000001,10.776800000000001 106.70627,10.775810000000002 106.70623,10.77579 106.70617000000001,10.77576 ...</a:t>
-                      </a:r>
-                      <a:endParaRPr lang="en-US" sz="1600" dirty="0" smtClean="0">
-                        <a:latin typeface="Cambria" panose="02040503050406030204" pitchFamily="18" charset="0"/>
-                      </a:endParaRPr>
-                    </a:p>
-                  </a:txBody>
-                  <a:tcPr/>
-                </a:tc>
-              </a:tr>
-              <a:tr h="366218">
-                <a:tc>
-                  <a:txBody>
-                    <a:bodyPr/>
-                    <a:lstStyle/>
-                    <a:p>
-                      <a:pPr algn="ctr"/>
-                      <a:r>
-                        <a:rPr lang="en-US" dirty="0" smtClean="0"/>
-                        <a:t>4</a:t>
-                      </a:r>
-                      <a:endParaRPr lang="en-US" dirty="0"/>
-                    </a:p>
-                  </a:txBody>
-                  <a:tcPr/>
-                </a:tc>
-                <a:tc>
-                  <a:txBody>
-                    <a:bodyPr/>
-                    <a:lstStyle/>
-                    <a:p>
-                      <a:pPr algn="ctr"/>
-                      <a:r>
-                        <a:rPr lang="en-US" dirty="0" smtClean="0"/>
-                        <a:t>True</a:t>
-                      </a:r>
-                      <a:endParaRPr lang="en-US" dirty="0"/>
-                    </a:p>
-                  </a:txBody>
-                  <a:tcPr/>
-                </a:tc>
-              </a:tr>
-              <a:tr h="366218">
-                <a:tc>
-                  <a:txBody>
-                    <a:bodyPr/>
-                    <a:lstStyle/>
-                    <a:p>
-                      <a:pPr algn="ctr"/>
-                      <a:r>
-                        <a:rPr lang="en-US" dirty="0" smtClean="0"/>
-                        <a:t>5</a:t>
-                      </a:r>
-                      <a:endParaRPr lang="en-US" dirty="0"/>
-                    </a:p>
-                  </a:txBody>
-                  <a:tcPr/>
-                </a:tc>
-                <a:tc>
-                  <a:txBody>
-                    <a:bodyPr/>
-                    <a:lstStyle/>
-                    <a:p>
-                      <a:pPr algn="ctr"/>
-                      <a:r>
-                        <a:rPr lang="en-US" sz="1800" b="0" i="0" kern="1200" dirty="0" smtClean="0">
-                          <a:solidFill>
-                            <a:schemeClr val="dk1"/>
-                          </a:solidFill>
-                          <a:effectLst/>
-                          <a:latin typeface="+mn-lt"/>
-                          <a:ea typeface="+mn-ea"/>
-                          <a:cs typeface="+mn-cs"/>
-                        </a:rPr>
-                        <a:t>1</a:t>
-                      </a:r>
-                      <a:endParaRPr lang="en-US" dirty="0"/>
-                    </a:p>
-                  </a:txBody>
-                  <a:tcPr/>
-                </a:tc>
-              </a:tr>
-              <a:tr h="366218">
-                <a:tc>
-                  <a:txBody>
-                    <a:bodyPr/>
-                    <a:lstStyle/>
-                    <a:p>
-                      <a:pPr algn="ctr"/>
-                      <a:r>
-                        <a:rPr lang="en-US" dirty="0" smtClean="0"/>
-                        <a:t>6</a:t>
-                      </a:r>
-                      <a:endParaRPr lang="en-US" dirty="0"/>
-                    </a:p>
-                  </a:txBody>
-                  <a:tcPr/>
-                </a:tc>
-                <a:tc>
-                  <a:txBody>
-                    <a:bodyPr/>
-                    <a:lstStyle/>
-                    <a:p>
-                      <a:pPr algn="ctr"/>
-                      <a:r>
-                        <a:rPr lang="en-US" sz="1800" b="0" i="0" kern="1200" dirty="0" smtClean="0">
-                          <a:solidFill>
-                            <a:schemeClr val="dk1"/>
-                          </a:solidFill>
-                          <a:effectLst/>
-                          <a:latin typeface="+mn-lt"/>
-                          <a:ea typeface="+mn-ea"/>
-                          <a:cs typeface="+mn-cs"/>
-                        </a:rPr>
-                        <a:t>468.747807122203</a:t>
-                      </a:r>
-                      <a:endParaRPr lang="en-US" dirty="0"/>
-                    </a:p>
-                  </a:txBody>
-                  <a:tcPr/>
-                </a:tc>
-              </a:tr>
-              <a:tr h="366218">
-                <a:tc>
-                  <a:txBody>
-                    <a:bodyPr/>
-                    <a:lstStyle/>
-                    <a:p>
-                      <a:pPr algn="ctr"/>
-                      <a:r>
-                        <a:rPr lang="en-US" dirty="0" smtClean="0"/>
-                        <a:t>7</a:t>
-                      </a:r>
-                      <a:endParaRPr lang="en-US" dirty="0"/>
-                    </a:p>
-                  </a:txBody>
-                  <a:tcPr/>
-                </a:tc>
-                <a:tc>
-                  <a:txBody>
-                    <a:bodyPr/>
-                    <a:lstStyle/>
-                    <a:p>
-                      <a:pPr algn="ctr"/>
-                      <a:r>
-                        <a:rPr lang="vi-VN" sz="1800" b="0" i="0" kern="1200" dirty="0" smtClean="0">
-                          <a:solidFill>
-                            <a:schemeClr val="dk1"/>
-                          </a:solidFill>
-                          <a:effectLst/>
-                          <a:latin typeface="+mn-lt"/>
-                          <a:ea typeface="+mn-ea"/>
-                          <a:cs typeface="+mn-cs"/>
-                        </a:rPr>
-                        <a:t>Công Trường Mê Linh</a:t>
-                      </a:r>
-                      <a:endParaRPr lang="en-US" dirty="0"/>
-                    </a:p>
-                  </a:txBody>
-                  <a:tcPr/>
-                </a:tc>
-              </a:tr>
-              <a:tr h="366218">
-                <a:tc>
-                  <a:txBody>
-                    <a:bodyPr/>
-                    <a:lstStyle/>
-                    <a:p>
-                      <a:pPr algn="ctr"/>
-                      <a:r>
-                        <a:rPr lang="en-US" dirty="0" smtClean="0"/>
-                        <a:t>8</a:t>
-                      </a:r>
-                      <a:endParaRPr lang="en-US" dirty="0"/>
-                    </a:p>
-                  </a:txBody>
-                  <a:tcPr/>
-                </a:tc>
-                <a:tc>
-                  <a:txBody>
-                    <a:bodyPr/>
-                    <a:lstStyle/>
-                    <a:p>
-                      <a:pPr algn="ctr"/>
-                      <a:r>
-                        <a:rPr lang="en-US" sz="1800" b="0" i="0" kern="1200" dirty="0" smtClean="0">
-                          <a:solidFill>
-                            <a:schemeClr val="dk1"/>
-                          </a:solidFill>
-                          <a:effectLst/>
-                          <a:latin typeface="+mn-lt"/>
-                          <a:ea typeface="+mn-ea"/>
-                          <a:cs typeface="+mn-cs"/>
-                        </a:rPr>
-                        <a:t>106.705856990563</a:t>
-                      </a:r>
-                      <a:endParaRPr lang="en-US" dirty="0"/>
-                    </a:p>
-                  </a:txBody>
-                  <a:tcPr/>
-                </a:tc>
-              </a:tr>
-              <a:tr h="366218">
-                <a:tc>
-                  <a:txBody>
-                    <a:bodyPr/>
-                    <a:lstStyle/>
-                    <a:p>
-                      <a:pPr algn="ctr"/>
-                      <a:r>
-                        <a:rPr lang="en-US" dirty="0" smtClean="0"/>
-                        <a:t>9</a:t>
-                      </a:r>
-                      <a:endParaRPr lang="en-US" dirty="0"/>
-                    </a:p>
-                  </a:txBody>
-                  <a:tcPr/>
-                </a:tc>
-                <a:tc>
-                  <a:txBody>
-                    <a:bodyPr/>
-                    <a:lstStyle/>
-                    <a:p>
-                      <a:pPr algn="ctr"/>
-                      <a:r>
-                        <a:rPr lang="en-US" sz="1800" b="0" i="0" kern="1200" dirty="0" smtClean="0">
-                          <a:solidFill>
-                            <a:schemeClr val="dk1"/>
-                          </a:solidFill>
-                          <a:effectLst/>
-                          <a:latin typeface="+mn-lt"/>
-                          <a:ea typeface="+mn-ea"/>
-                          <a:cs typeface="+mn-cs"/>
-                        </a:rPr>
-                        <a:t>10.7767894851893</a:t>
-                      </a:r>
-                      <a:endParaRPr lang="en-US" dirty="0"/>
-                    </a:p>
-                  </a:txBody>
-                  <a:tcPr/>
-                </a:tc>
-              </a:tr>
-              <a:tr h="366218">
-                <a:tc>
-                  <a:txBody>
-                    <a:bodyPr/>
-                    <a:lstStyle/>
-                    <a:p>
-                      <a:pPr algn="ctr"/>
-                      <a:r>
-                        <a:rPr lang="en-US" dirty="0" smtClean="0"/>
-                        <a:t>10</a:t>
-                      </a:r>
-                      <a:endParaRPr lang="en-US" dirty="0"/>
-                    </a:p>
-                  </a:txBody>
-                  <a:tcPr/>
-                </a:tc>
-                <a:tc>
-                  <a:txBody>
-                    <a:bodyPr/>
-                    <a:lstStyle/>
-                    <a:p>
-                      <a:pPr algn="ctr"/>
-                      <a:r>
-                        <a:rPr lang="en-US" sz="1800" b="0" i="0" kern="1200" dirty="0" smtClean="0">
-                          <a:solidFill>
-                            <a:schemeClr val="dk1"/>
-                          </a:solidFill>
-                          <a:effectLst/>
-                          <a:latin typeface="+mn-lt"/>
-                          <a:ea typeface="+mn-ea"/>
-                          <a:cs typeface="+mn-cs"/>
-                        </a:rPr>
-                        <a:t>01</a:t>
-                      </a:r>
-                      <a:endParaRPr lang="en-US" dirty="0"/>
-                    </a:p>
-                  </a:txBody>
-                  <a:tcPr/>
-                </a:tc>
-              </a:tr>
-              <a:tr h="366218">
-                <a:tc>
-                  <a:txBody>
-                    <a:bodyPr/>
-                    <a:lstStyle/>
-                    <a:p>
-                      <a:pPr algn="ctr"/>
-                      <a:r>
-                        <a:rPr lang="en-US" dirty="0" smtClean="0"/>
-                        <a:t>11</a:t>
-                      </a:r>
-                      <a:endParaRPr lang="en-US" dirty="0"/>
-                    </a:p>
-                  </a:txBody>
-                  <a:tcPr/>
-                </a:tc>
-                <a:tc>
-                  <a:txBody>
-                    <a:bodyPr/>
-                    <a:lstStyle/>
-                    <a:p>
-                      <a:pPr algn="ctr"/>
-                      <a:r>
-                        <a:rPr lang="en-US" sz="1800" b="0" i="0" kern="1200" dirty="0" err="1" smtClean="0">
-                          <a:solidFill>
-                            <a:schemeClr val="dk1"/>
-                          </a:solidFill>
-                          <a:effectLst/>
-                          <a:latin typeface="+mn-lt"/>
-                          <a:ea typeface="+mn-ea"/>
-                          <a:cs typeface="+mn-cs"/>
-                        </a:rPr>
-                        <a:t>Bến</a:t>
-                      </a:r>
-                      <a:r>
-                        <a:rPr lang="en-US" sz="1800" b="0" i="0" kern="1200" dirty="0" smtClean="0">
-                          <a:solidFill>
-                            <a:schemeClr val="dk1"/>
-                          </a:solidFill>
-                          <a:effectLst/>
-                          <a:latin typeface="+mn-lt"/>
-                          <a:ea typeface="+mn-ea"/>
-                          <a:cs typeface="+mn-cs"/>
-                        </a:rPr>
-                        <a:t> </a:t>
-                      </a:r>
-                      <a:r>
-                        <a:rPr lang="en-US" sz="1800" b="0" i="0" kern="1200" dirty="0" err="1" smtClean="0">
-                          <a:solidFill>
-                            <a:schemeClr val="dk1"/>
-                          </a:solidFill>
-                          <a:effectLst/>
-                          <a:latin typeface="+mn-lt"/>
-                          <a:ea typeface="+mn-ea"/>
-                          <a:cs typeface="+mn-cs"/>
-                        </a:rPr>
-                        <a:t>Thành</a:t>
-                      </a:r>
-                      <a:r>
-                        <a:rPr lang="en-US" sz="1800" b="0" i="0" kern="1200" dirty="0" smtClean="0">
-                          <a:solidFill>
-                            <a:schemeClr val="dk1"/>
-                          </a:solidFill>
-                          <a:effectLst/>
-                          <a:latin typeface="+mn-lt"/>
-                          <a:ea typeface="+mn-ea"/>
-                          <a:cs typeface="+mn-cs"/>
-                        </a:rPr>
-                        <a:t>- BX </a:t>
-                      </a:r>
-                      <a:r>
-                        <a:rPr lang="en-US" sz="1800" b="0" i="0" kern="1200" dirty="0" err="1" smtClean="0">
-                          <a:solidFill>
-                            <a:schemeClr val="dk1"/>
-                          </a:solidFill>
-                          <a:effectLst/>
-                          <a:latin typeface="+mn-lt"/>
-                          <a:ea typeface="+mn-ea"/>
-                          <a:cs typeface="+mn-cs"/>
-                        </a:rPr>
-                        <a:t>Chợ</a:t>
-                      </a:r>
-                      <a:r>
-                        <a:rPr lang="en-US" sz="1800" b="0" i="0" kern="1200" dirty="0" smtClean="0">
-                          <a:solidFill>
-                            <a:schemeClr val="dk1"/>
-                          </a:solidFill>
-                          <a:effectLst/>
-                          <a:latin typeface="+mn-lt"/>
-                          <a:ea typeface="+mn-ea"/>
-                          <a:cs typeface="+mn-cs"/>
-                        </a:rPr>
-                        <a:t> </a:t>
-                      </a:r>
-                      <a:r>
-                        <a:rPr lang="en-US" sz="1800" b="0" i="0" kern="1200" dirty="0" err="1" smtClean="0">
-                          <a:solidFill>
-                            <a:schemeClr val="dk1"/>
-                          </a:solidFill>
-                          <a:effectLst/>
-                          <a:latin typeface="+mn-lt"/>
-                          <a:ea typeface="+mn-ea"/>
-                          <a:cs typeface="+mn-cs"/>
-                        </a:rPr>
-                        <a:t>Lớn</a:t>
-                      </a:r>
-                      <a:endParaRPr lang="en-US" dirty="0"/>
-                    </a:p>
-                  </a:txBody>
-                  <a:tcPr/>
-                </a:tc>
-              </a:tr>
-              <a:tr h="366218">
-                <a:tc>
-                  <a:txBody>
-                    <a:bodyPr/>
-                    <a:lstStyle/>
-                    <a:p>
-                      <a:pPr algn="ctr"/>
-                      <a:r>
-                        <a:rPr lang="en-US" dirty="0" smtClean="0"/>
-                        <a:t>12</a:t>
-                      </a:r>
-                      <a:endParaRPr lang="en-US" dirty="0"/>
-                    </a:p>
-                  </a:txBody>
-                  <a:tcPr/>
-                </a:tc>
-                <a:tc>
-                  <a:txBody>
-                    <a:bodyPr/>
-                    <a:lstStyle/>
-                    <a:p>
-                      <a:pPr algn="ctr"/>
-                      <a:r>
-                        <a:rPr lang="vi-VN" sz="1800" b="0" i="0" kern="1200" dirty="0" smtClean="0">
-                          <a:solidFill>
-                            <a:schemeClr val="dk1"/>
-                          </a:solidFill>
-                          <a:effectLst/>
-                          <a:latin typeface="+mn-lt"/>
-                          <a:ea typeface="+mn-ea"/>
-                          <a:cs typeface="+mn-cs"/>
-                        </a:rPr>
-                        <a:t>Công trường Mê Linh, Thi Sách, Quận 1</a:t>
-                      </a:r>
-                      <a:endParaRPr lang="en-US" dirty="0"/>
-                    </a:p>
-                  </a:txBody>
-                  <a:tcPr/>
-                </a:tc>
-              </a:tr>
-              <a:tr h="366218">
-                <a:tc>
-                  <a:txBody>
-                    <a:bodyPr/>
-                    <a:lstStyle/>
-                    <a:p>
-                      <a:pPr algn="ctr"/>
-                      <a:r>
-                        <a:rPr lang="en-US" dirty="0" smtClean="0"/>
-                        <a:t>13</a:t>
-                      </a:r>
-                      <a:endParaRPr lang="en-US" dirty="0"/>
-                    </a:p>
-                  </a:txBody>
-                  <a:tcPr/>
-                </a:tc>
-                <a:tc>
-                  <a:txBody>
-                    <a:bodyPr/>
-                    <a:lstStyle/>
-                    <a:p>
-                      <a:pPr algn="ctr"/>
-                      <a:r>
-                        <a:rPr lang="en-US" sz="1800" b="0" i="0" kern="1200" dirty="0" smtClean="0">
-                          <a:solidFill>
-                            <a:schemeClr val="dk1"/>
-                          </a:solidFill>
-                          <a:effectLst/>
-                          <a:latin typeface="+mn-lt"/>
-                          <a:ea typeface="+mn-ea"/>
-                          <a:cs typeface="+mn-cs"/>
-                        </a:rPr>
-                        <a:t>BX06</a:t>
-                      </a:r>
-                      <a:endParaRPr lang="en-US" dirty="0"/>
-                    </a:p>
-                  </a:txBody>
-                  <a:tcPr/>
-                </a:tc>
-              </a:tr>
-            </a:tbl>
-          </a:graphicData>
-        </a:graphic>
-      </p:graphicFrame>
-      <p:sp>
-        <p:nvSpPr>
-          <p:cNvPr id="5" name="Rectangle 4"/>
-          <p:cNvSpPr/>
-          <p:nvPr/>
-        </p:nvSpPr>
-        <p:spPr>
-          <a:xfrm>
-            <a:off x="137231" y="6192140"/>
-            <a:ext cx="7490460" cy="369332"/>
-          </a:xfrm>
-          <a:prstGeom prst="rect">
-            <a:avLst/>
-          </a:prstGeom>
-        </p:spPr>
-        <p:txBody>
-          <a:bodyPr wrap="square">
-            <a:spAutoFit/>
-          </a:bodyPr>
-          <a:lstStyle/>
-          <a:p>
-            <a:r>
-              <a:rPr lang="en-US" dirty="0" smtClean="0"/>
-              <a:t>http://mapbus.ebms.vn/ajax.aspx?action=listRouteStations&amp;</a:t>
-            </a:r>
-            <a:r>
-              <a:rPr lang="en-US" dirty="0" smtClean="0">
-                <a:solidFill>
-                  <a:srgbClr val="FF0000"/>
-                </a:solidFill>
-              </a:rPr>
-              <a:t>rid=1</a:t>
-            </a:r>
-            <a:r>
-              <a:rPr lang="en-US" dirty="0" smtClean="0"/>
-              <a:t>&amp;</a:t>
-            </a:r>
-            <a:r>
-              <a:rPr lang="en-US" dirty="0" smtClean="0">
-                <a:solidFill>
-                  <a:srgbClr val="FF0000"/>
-                </a:solidFill>
-              </a:rPr>
-              <a:t>isgo=true</a:t>
-            </a:r>
-            <a:endParaRPr lang="en-US" dirty="0">
-              <a:solidFill>
-                <a:srgbClr val="FF0000"/>
-              </a:solidFill>
-            </a:endParaRPr>
-          </a:p>
-        </p:txBody>
-      </p:sp>
-      <p:pic>
-        <p:nvPicPr>
-          <p:cNvPr id="2" name="Picture 1"/>
-          <p:cNvPicPr>
-            <a:picLocks noChangeAspect="1"/>
-          </p:cNvPicPr>
-          <p:nvPr/>
-        </p:nvPicPr>
-        <p:blipFill>
-          <a:blip r:embed="rId2">
-            <a:extLst>
-              <a:ext uri="{28A0092B-C50C-407E-A947-70E740481C1C}">
-                <a14:useLocalDpi xmlns:a14="http://schemas.microsoft.com/office/drawing/2010/main" val="0"/>
-              </a:ext>
-            </a:extLst>
-          </a:blip>
-          <a:stretch>
-            <a:fillRect/>
-          </a:stretch>
-        </p:blipFill>
-        <p:spPr>
-          <a:xfrm>
-            <a:off x="6871959" y="2265882"/>
-            <a:ext cx="2130741" cy="3926258"/>
-          </a:xfrm>
-          <a:prstGeom prst="rect">
-            <a:avLst/>
-          </a:prstGeom>
-        </p:spPr>
-      </p:pic>
-      <p:graphicFrame>
-        <p:nvGraphicFramePr>
-          <p:cNvPr id="8" name="Table 7"/>
-          <p:cNvGraphicFramePr>
-            <a:graphicFrameLocks noGrp="1"/>
-          </p:cNvGraphicFramePr>
-          <p:nvPr>
-            <p:extLst>
-              <p:ext uri="{D42A27DB-BD31-4B8C-83A1-F6EECF244321}">
-                <p14:modId xmlns:p14="http://schemas.microsoft.com/office/powerpoint/2010/main" val="2386833447"/>
-              </p:ext>
-            </p:extLst>
-          </p:nvPr>
-        </p:nvGraphicFramePr>
-        <p:xfrm>
-          <a:off x="6650407" y="75488"/>
-          <a:ext cx="1808861" cy="2011680"/>
-        </p:xfrm>
-        <a:graphic>
-          <a:graphicData uri="http://schemas.openxmlformats.org/drawingml/2006/table">
-            <a:tbl>
-              <a:tblPr firstRow="1" bandRow="1">
-                <a:tableStyleId>{21E4AEA4-8DFA-4A89-87EB-49C32662AFE0}</a:tableStyleId>
-              </a:tblPr>
-              <a:tblGrid>
-                <a:gridCol w="1808861"/>
-              </a:tblGrid>
-              <a:tr h="310682">
-                <a:tc>
-                  <a:txBody>
-                    <a:bodyPr/>
-                    <a:lstStyle/>
-                    <a:p>
-                      <a:pPr algn="ctr"/>
-                      <a:r>
-                        <a:rPr lang="en-US" sz="1600" dirty="0" err="1" smtClean="0">
-                          <a:latin typeface="Cambria" panose="02040503050406030204" pitchFamily="18" charset="0"/>
-                        </a:rPr>
-                        <a:t>PathInfo</a:t>
-                      </a:r>
-                      <a:endParaRPr lang="en-US" sz="1600" dirty="0">
-                        <a:latin typeface="Cambria" panose="02040503050406030204" pitchFamily="18" charset="0"/>
-                      </a:endParaRPr>
-                    </a:p>
-                  </a:txBody>
-                  <a:tcPr/>
-                </a:tc>
-              </a:tr>
-              <a:tr h="300814">
-                <a:tc>
-                  <a:txBody>
-                    <a:bodyPr/>
-                    <a:lstStyle/>
-                    <a:p>
-                      <a:r>
-                        <a:rPr lang="en-US" sz="1600" dirty="0" err="1" smtClean="0">
-                          <a:latin typeface="Cambria" panose="02040503050406030204" pitchFamily="18" charset="0"/>
-                        </a:rPr>
-                        <a:t>FromStationID</a:t>
-                      </a:r>
-                      <a:endParaRPr lang="en-US" sz="1600" dirty="0">
-                        <a:latin typeface="Cambria" panose="02040503050406030204" pitchFamily="18" charset="0"/>
-                      </a:endParaRPr>
-                    </a:p>
-                  </a:txBody>
-                  <a:tcPr/>
-                </a:tc>
-              </a:tr>
-              <a:tr h="300814">
-                <a:tc>
-                  <a:txBody>
-                    <a:bodyPr/>
-                    <a:lstStyle/>
-                    <a:p>
-                      <a:pPr marL="0" marR="0" indent="0" algn="l" defTabSz="914400" rtl="0" eaLnBrk="1" fontAlgn="auto" latinLnBrk="0" hangingPunct="1">
-                        <a:lnSpc>
-                          <a:spcPct val="100000"/>
-                        </a:lnSpc>
-                        <a:spcBef>
-                          <a:spcPts val="0"/>
-                        </a:spcBef>
-                        <a:spcAft>
-                          <a:spcPts val="0"/>
-                        </a:spcAft>
-                        <a:buClrTx/>
-                        <a:buSzTx/>
-                        <a:buFontTx/>
-                        <a:buNone/>
-                        <a:tabLst/>
-                        <a:defRPr/>
-                      </a:pPr>
-                      <a:r>
-                        <a:rPr lang="en-US" sz="1600" dirty="0" err="1" smtClean="0">
-                          <a:latin typeface="Cambria" panose="02040503050406030204" pitchFamily="18" charset="0"/>
-                        </a:rPr>
-                        <a:t>ToStationID</a:t>
-                      </a:r>
-                      <a:endParaRPr lang="en-US" sz="1600" dirty="0" smtClean="0">
-                        <a:latin typeface="Cambria" panose="02040503050406030204" pitchFamily="18" charset="0"/>
-                      </a:endParaRPr>
-                    </a:p>
-                  </a:txBody>
-                  <a:tcPr/>
-                </a:tc>
-              </a:tr>
-              <a:tr h="300814">
-                <a:tc>
-                  <a:txBody>
-                    <a:bodyPr/>
-                    <a:lstStyle/>
-                    <a:p>
-                      <a:pPr marL="0" marR="0" indent="0" algn="l" defTabSz="914400" rtl="0" eaLnBrk="1" fontAlgn="auto" latinLnBrk="0" hangingPunct="1">
-                        <a:lnSpc>
-                          <a:spcPct val="100000"/>
-                        </a:lnSpc>
-                        <a:spcBef>
-                          <a:spcPts val="0"/>
-                        </a:spcBef>
-                        <a:spcAft>
-                          <a:spcPts val="0"/>
-                        </a:spcAft>
-                        <a:buClrTx/>
-                        <a:buSzTx/>
-                        <a:buFontTx/>
-                        <a:buNone/>
-                        <a:tabLst/>
-                        <a:defRPr/>
-                      </a:pPr>
-                      <a:r>
-                        <a:rPr lang="en-US" sz="1600" dirty="0" err="1" smtClean="0">
-                          <a:latin typeface="Cambria" panose="02040503050406030204" pitchFamily="18" charset="0"/>
-                        </a:rPr>
-                        <a:t>RouteID</a:t>
-                      </a:r>
-                      <a:endParaRPr lang="en-US" sz="1600" dirty="0" smtClean="0">
-                        <a:latin typeface="Cambria" panose="02040503050406030204" pitchFamily="18" charset="0"/>
-                      </a:endParaRPr>
-                    </a:p>
-                  </a:txBody>
-                  <a:tcPr/>
-                </a:tc>
-              </a:tr>
-              <a:tr h="300814">
-                <a:tc>
-                  <a:txBody>
-                    <a:bodyPr/>
-                    <a:lstStyle/>
-                    <a:p>
-                      <a:pPr marL="0" marR="0" indent="0" algn="l" defTabSz="914400" rtl="0" eaLnBrk="1" fontAlgn="auto" latinLnBrk="0" hangingPunct="1">
-                        <a:lnSpc>
-                          <a:spcPct val="100000"/>
-                        </a:lnSpc>
-                        <a:spcBef>
-                          <a:spcPts val="0"/>
-                        </a:spcBef>
-                        <a:spcAft>
-                          <a:spcPts val="0"/>
-                        </a:spcAft>
-                        <a:buClrTx/>
-                        <a:buSzTx/>
-                        <a:buFontTx/>
-                        <a:buNone/>
-                        <a:tabLst/>
-                        <a:defRPr/>
-                      </a:pPr>
-                      <a:r>
-                        <a:rPr lang="en-US" sz="1600" dirty="0" err="1" smtClean="0">
-                          <a:latin typeface="Cambria" panose="02040503050406030204" pitchFamily="18" charset="0"/>
-                        </a:rPr>
-                        <a:t>PahtInfoNo</a:t>
-                      </a:r>
-                      <a:endParaRPr lang="en-US" sz="1600" dirty="0" smtClean="0">
-                        <a:latin typeface="Cambria" panose="02040503050406030204" pitchFamily="18" charset="0"/>
-                      </a:endParaRPr>
-                    </a:p>
-                  </a:txBody>
-                  <a:tcPr/>
-                </a:tc>
-              </a:tr>
-              <a:tr h="300814">
-                <a:tc>
-                  <a:txBody>
-                    <a:bodyPr/>
-                    <a:lstStyle/>
-                    <a:p>
-                      <a:pPr marL="0" marR="0" indent="0" algn="l" defTabSz="914400" rtl="0" eaLnBrk="1" fontAlgn="auto" latinLnBrk="0" hangingPunct="1">
-                        <a:lnSpc>
-                          <a:spcPct val="100000"/>
-                        </a:lnSpc>
-                        <a:spcBef>
-                          <a:spcPts val="0"/>
-                        </a:spcBef>
-                        <a:spcAft>
-                          <a:spcPts val="0"/>
-                        </a:spcAft>
-                        <a:buClrTx/>
-                        <a:buSzTx/>
-                        <a:buFontTx/>
-                        <a:buNone/>
-                        <a:tabLst/>
-                        <a:defRPr/>
-                      </a:pPr>
-                      <a:r>
-                        <a:rPr lang="en-US" sz="1600" dirty="0" err="1" smtClean="0">
-                          <a:latin typeface="Cambria" panose="02040503050406030204" pitchFamily="18" charset="0"/>
-                        </a:rPr>
-                        <a:t>MiddlePoints</a:t>
-                      </a:r>
-                      <a:endParaRPr lang="en-US" sz="1600" dirty="0" smtClean="0">
-                        <a:latin typeface="Cambria" panose="02040503050406030204" pitchFamily="18" charset="0"/>
-                      </a:endParaRPr>
-                    </a:p>
-                  </a:txBody>
-                  <a:tcPr/>
-                </a:tc>
-              </a:tr>
-            </a:tbl>
-          </a:graphicData>
-        </a:graphic>
-      </p:graphicFrame>
-      <p:cxnSp>
-        <p:nvCxnSpPr>
-          <p:cNvPr id="7" name="Straight Arrow Connector 6"/>
-          <p:cNvCxnSpPr/>
-          <p:nvPr/>
-        </p:nvCxnSpPr>
-        <p:spPr>
-          <a:xfrm>
-            <a:off x="5631679" y="1751889"/>
-            <a:ext cx="1102407" cy="153823"/>
-          </a:xfrm>
-          <a:prstGeom prst="straightConnector1">
-            <a:avLst/>
-          </a:prstGeom>
-          <a:ln>
-            <a:tailEnd type="triangle"/>
-          </a:ln>
-        </p:spPr>
-        <p:style>
-          <a:lnRef idx="3">
-            <a:schemeClr val="accent2"/>
-          </a:lnRef>
-          <a:fillRef idx="0">
-            <a:schemeClr val="accent2"/>
-          </a:fillRef>
-          <a:effectRef idx="2">
-            <a:schemeClr val="accent2"/>
-          </a:effectRef>
-          <a:fontRef idx="minor">
-            <a:schemeClr val="tx1"/>
-          </a:fontRef>
-        </p:style>
-      </p:cxnSp>
-      <p:sp>
-        <p:nvSpPr>
-          <p:cNvPr id="10" name="Diamond 9"/>
-          <p:cNvSpPr/>
-          <p:nvPr/>
-        </p:nvSpPr>
-        <p:spPr>
-          <a:xfrm>
-            <a:off x="7424871" y="2656318"/>
-            <a:ext cx="119641" cy="102549"/>
-          </a:xfrm>
-          <a:prstGeom prst="diamond">
-            <a:avLst/>
-          </a:prstGeom>
-          <a:solidFill>
-            <a:srgbClr val="FF0000"/>
-          </a:solidFill>
-        </p:spPr>
-        <p:style>
-          <a:lnRef idx="2">
-            <a:schemeClr val="accent2">
-              <a:shade val="50000"/>
-            </a:schemeClr>
-          </a:lnRef>
-          <a:fillRef idx="1">
-            <a:schemeClr val="accent2"/>
-          </a:fillRef>
-          <a:effectRef idx="0">
-            <a:schemeClr val="accent2"/>
-          </a:effectRef>
-          <a:fontRef idx="minor">
-            <a:schemeClr val="lt1"/>
-          </a:fontRef>
-        </p:style>
-        <p:txBody>
-          <a:bodyPr rtlCol="0" anchor="ctr"/>
-          <a:lstStyle/>
-          <a:p>
-            <a:pPr algn="ctr"/>
-            <a:endParaRPr lang="en-US"/>
-          </a:p>
-        </p:txBody>
-      </p:sp>
-      <p:sp>
-        <p:nvSpPr>
-          <p:cNvPr id="11" name="Diamond 10"/>
-          <p:cNvSpPr/>
-          <p:nvPr/>
-        </p:nvSpPr>
-        <p:spPr>
-          <a:xfrm>
-            <a:off x="7544512" y="2881932"/>
-            <a:ext cx="119641" cy="102549"/>
-          </a:xfrm>
-          <a:prstGeom prst="diamond">
-            <a:avLst/>
-          </a:prstGeom>
-          <a:solidFill>
-            <a:srgbClr val="FF0000"/>
-          </a:solidFill>
-        </p:spPr>
-        <p:style>
-          <a:lnRef idx="2">
-            <a:schemeClr val="accent2">
-              <a:shade val="50000"/>
-            </a:schemeClr>
-          </a:lnRef>
-          <a:fillRef idx="1">
-            <a:schemeClr val="accent2"/>
-          </a:fillRef>
-          <a:effectRef idx="0">
-            <a:schemeClr val="accent2"/>
-          </a:effectRef>
-          <a:fontRef idx="minor">
-            <a:schemeClr val="lt1"/>
-          </a:fontRef>
-        </p:style>
-        <p:txBody>
-          <a:bodyPr rtlCol="0" anchor="ctr"/>
-          <a:lstStyle/>
-          <a:p>
-            <a:pPr algn="ctr"/>
-            <a:endParaRPr lang="en-US"/>
-          </a:p>
-        </p:txBody>
-      </p:sp>
-      <p:sp>
-        <p:nvSpPr>
-          <p:cNvPr id="12" name="Diamond 11"/>
-          <p:cNvSpPr/>
-          <p:nvPr/>
-        </p:nvSpPr>
-        <p:spPr>
-          <a:xfrm>
-            <a:off x="7664153" y="3245978"/>
-            <a:ext cx="119641" cy="102549"/>
-          </a:xfrm>
-          <a:prstGeom prst="diamond">
-            <a:avLst/>
-          </a:prstGeom>
-          <a:solidFill>
-            <a:srgbClr val="FF0000"/>
-          </a:solidFill>
-        </p:spPr>
-        <p:style>
-          <a:lnRef idx="2">
-            <a:schemeClr val="accent2">
-              <a:shade val="50000"/>
-            </a:schemeClr>
-          </a:lnRef>
-          <a:fillRef idx="1">
-            <a:schemeClr val="accent2"/>
-          </a:fillRef>
-          <a:effectRef idx="0">
-            <a:schemeClr val="accent2"/>
-          </a:effectRef>
-          <a:fontRef idx="minor">
-            <a:schemeClr val="lt1"/>
-          </a:fontRef>
-        </p:style>
-        <p:txBody>
-          <a:bodyPr rtlCol="0" anchor="ctr"/>
-          <a:lstStyle/>
-          <a:p>
-            <a:pPr algn="ctr"/>
-            <a:endParaRPr lang="en-US"/>
-          </a:p>
-        </p:txBody>
-      </p:sp>
-      <p:sp>
-        <p:nvSpPr>
-          <p:cNvPr id="13" name="Diamond 12"/>
-          <p:cNvSpPr/>
-          <p:nvPr/>
-        </p:nvSpPr>
-        <p:spPr>
-          <a:xfrm>
-            <a:off x="7484691" y="3664722"/>
-            <a:ext cx="119641" cy="102549"/>
-          </a:xfrm>
-          <a:prstGeom prst="diamond">
-            <a:avLst/>
-          </a:prstGeom>
-          <a:solidFill>
-            <a:srgbClr val="FF0000"/>
-          </a:solidFill>
-        </p:spPr>
-        <p:style>
-          <a:lnRef idx="2">
-            <a:schemeClr val="accent2">
-              <a:shade val="50000"/>
-            </a:schemeClr>
-          </a:lnRef>
-          <a:fillRef idx="1">
-            <a:schemeClr val="accent2"/>
-          </a:fillRef>
-          <a:effectRef idx="0">
-            <a:schemeClr val="accent2"/>
-          </a:effectRef>
-          <a:fontRef idx="minor">
-            <a:schemeClr val="lt1"/>
-          </a:fontRef>
-        </p:style>
-        <p:txBody>
-          <a:bodyPr rtlCol="0" anchor="ctr"/>
-          <a:lstStyle/>
-          <a:p>
-            <a:pPr algn="ctr"/>
-            <a:endParaRPr lang="en-US"/>
-          </a:p>
-        </p:txBody>
-      </p:sp>
-      <p:sp>
-        <p:nvSpPr>
-          <p:cNvPr id="14" name="Diamond 13"/>
-          <p:cNvSpPr/>
-          <p:nvPr/>
-        </p:nvSpPr>
-        <p:spPr>
-          <a:xfrm>
-            <a:off x="7484691" y="4198547"/>
-            <a:ext cx="119641" cy="102549"/>
-          </a:xfrm>
-          <a:prstGeom prst="diamond">
-            <a:avLst/>
-          </a:prstGeom>
-          <a:solidFill>
-            <a:srgbClr val="FF0000"/>
-          </a:solidFill>
-        </p:spPr>
-        <p:style>
-          <a:lnRef idx="2">
-            <a:schemeClr val="accent2">
-              <a:shade val="50000"/>
-            </a:schemeClr>
-          </a:lnRef>
-          <a:fillRef idx="1">
-            <a:schemeClr val="accent2"/>
-          </a:fillRef>
-          <a:effectRef idx="0">
-            <a:schemeClr val="accent2"/>
-          </a:effectRef>
-          <a:fontRef idx="minor">
-            <a:schemeClr val="lt1"/>
-          </a:fontRef>
-        </p:style>
-        <p:txBody>
-          <a:bodyPr rtlCol="0" anchor="ctr"/>
-          <a:lstStyle/>
-          <a:p>
-            <a:pPr algn="ctr"/>
-            <a:endParaRPr lang="en-US"/>
-          </a:p>
-        </p:txBody>
-      </p:sp>
-      <p:sp>
-        <p:nvSpPr>
-          <p:cNvPr id="15" name="Diamond 14"/>
-          <p:cNvSpPr/>
-          <p:nvPr/>
-        </p:nvSpPr>
-        <p:spPr>
-          <a:xfrm>
-            <a:off x="7877508" y="4408206"/>
-            <a:ext cx="119641" cy="102549"/>
-          </a:xfrm>
-          <a:prstGeom prst="diamond">
-            <a:avLst/>
-          </a:prstGeom>
-          <a:solidFill>
-            <a:srgbClr val="FF0000"/>
-          </a:solidFill>
-        </p:spPr>
-        <p:style>
-          <a:lnRef idx="2">
-            <a:schemeClr val="accent2">
-              <a:shade val="50000"/>
-            </a:schemeClr>
-          </a:lnRef>
-          <a:fillRef idx="1">
-            <a:schemeClr val="accent2"/>
-          </a:fillRef>
-          <a:effectRef idx="0">
-            <a:schemeClr val="accent2"/>
-          </a:effectRef>
-          <a:fontRef idx="minor">
-            <a:schemeClr val="lt1"/>
-          </a:fontRef>
-        </p:style>
-        <p:txBody>
-          <a:bodyPr rtlCol="0" anchor="ctr"/>
-          <a:lstStyle/>
-          <a:p>
-            <a:pPr algn="ctr"/>
-            <a:endParaRPr lang="en-US"/>
-          </a:p>
-        </p:txBody>
-      </p:sp>
-      <p:sp>
-        <p:nvSpPr>
-          <p:cNvPr id="16" name="Diamond 15"/>
-          <p:cNvSpPr/>
-          <p:nvPr/>
-        </p:nvSpPr>
-        <p:spPr>
-          <a:xfrm>
-            <a:off x="7997149" y="4920954"/>
-            <a:ext cx="119641" cy="102549"/>
-          </a:xfrm>
-          <a:prstGeom prst="diamond">
-            <a:avLst/>
-          </a:prstGeom>
-          <a:solidFill>
-            <a:srgbClr val="FF0000"/>
-          </a:solidFill>
-        </p:spPr>
-        <p:style>
-          <a:lnRef idx="2">
-            <a:schemeClr val="accent2">
-              <a:shade val="50000"/>
-            </a:schemeClr>
-          </a:lnRef>
-          <a:fillRef idx="1">
-            <a:schemeClr val="accent2"/>
-          </a:fillRef>
-          <a:effectRef idx="0">
-            <a:schemeClr val="accent2"/>
-          </a:effectRef>
-          <a:fontRef idx="minor">
-            <a:schemeClr val="lt1"/>
-          </a:fontRef>
-        </p:style>
-        <p:txBody>
-          <a:bodyPr rtlCol="0" anchor="ctr"/>
-          <a:lstStyle/>
-          <a:p>
-            <a:pPr algn="ctr"/>
-            <a:endParaRPr lang="en-US"/>
-          </a:p>
-        </p:txBody>
-      </p:sp>
-      <p:sp>
-        <p:nvSpPr>
-          <p:cNvPr id="17" name="Diamond 16"/>
-          <p:cNvSpPr/>
-          <p:nvPr/>
-        </p:nvSpPr>
-        <p:spPr>
-          <a:xfrm>
-            <a:off x="7937328" y="5382427"/>
-            <a:ext cx="119641" cy="102549"/>
-          </a:xfrm>
-          <a:prstGeom prst="diamond">
-            <a:avLst/>
-          </a:prstGeom>
-          <a:solidFill>
-            <a:srgbClr val="FF0000"/>
-          </a:solidFill>
-        </p:spPr>
-        <p:style>
-          <a:lnRef idx="2">
-            <a:schemeClr val="accent2">
-              <a:shade val="50000"/>
-            </a:schemeClr>
-          </a:lnRef>
-          <a:fillRef idx="1">
-            <a:schemeClr val="accent2"/>
-          </a:fillRef>
-          <a:effectRef idx="0">
-            <a:schemeClr val="accent2"/>
-          </a:effectRef>
-          <a:fontRef idx="minor">
-            <a:schemeClr val="lt1"/>
-          </a:fontRef>
-        </p:style>
-        <p:txBody>
-          <a:bodyPr rtlCol="0" anchor="ctr"/>
-          <a:lstStyle/>
-          <a:p>
-            <a:pPr algn="ctr"/>
-            <a:endParaRPr lang="en-US"/>
-          </a:p>
-        </p:txBody>
-      </p:sp>
-      <p:cxnSp>
-        <p:nvCxnSpPr>
-          <p:cNvPr id="18" name="Straight Arrow Connector 17"/>
-          <p:cNvCxnSpPr>
-            <a:endCxn id="11" idx="1"/>
-          </p:cNvCxnSpPr>
-          <p:nvPr/>
-        </p:nvCxnSpPr>
-        <p:spPr>
-          <a:xfrm>
-            <a:off x="5247118" y="2265882"/>
-            <a:ext cx="2297394" cy="667325"/>
-          </a:xfrm>
-          <a:prstGeom prst="straightConnector1">
-            <a:avLst/>
-          </a:prstGeom>
-          <a:ln>
-            <a:tailEnd type="triangle"/>
-          </a:ln>
-        </p:spPr>
-        <p:style>
-          <a:lnRef idx="3">
-            <a:schemeClr val="accent2"/>
-          </a:lnRef>
-          <a:fillRef idx="0">
-            <a:schemeClr val="accent2"/>
-          </a:fillRef>
-          <a:effectRef idx="2">
-            <a:schemeClr val="accent2"/>
-          </a:effectRef>
-          <a:fontRef idx="minor">
-            <a:schemeClr val="tx1"/>
-          </a:fontRef>
-        </p:style>
-      </p:cxnSp>
-    </p:spTree>
-    <p:extLst>
-      <p:ext uri="{BB962C8B-B14F-4D97-AF65-F5344CB8AC3E}">
-        <p14:creationId xmlns:p14="http://schemas.microsoft.com/office/powerpoint/2010/main" val="1220495010"/>
       </p:ext>
     </p:extLst>
   </p:cSld>
@@ -10751,8 +10687,8 @@
         </p:nvSpPr>
         <p:spPr>
           <a:xfrm>
-            <a:off x="666572" y="384561"/>
-            <a:ext cx="7810856" cy="5896598"/>
+            <a:off x="0" y="0"/>
+            <a:ext cx="9144000" cy="6858000"/>
           </a:xfrm>
           <a:prstGeom prst="rect">
             <a:avLst/>
@@ -11404,15 +11340,7 @@
                   <a:srgbClr val="0070C0"/>
                 </a:solidFill>
               </a:rPr>
-              <a:t>Time </a:t>
-            </a:r>
-            <a:r>
-              <a:rPr lang="en-US" dirty="0" smtClean="0">
-                <a:solidFill>
-                  <a:srgbClr val="0070C0"/>
-                </a:solidFill>
-              </a:rPr>
-              <a:t>of route depart</a:t>
+              <a:t>Time of route depart</a:t>
             </a:r>
             <a:endParaRPr lang="en-US" dirty="0"/>
           </a:p>
@@ -12325,8 +12253,8 @@
           </a:p>
         </p:txBody>
       </p:sp>
-      <mc:AlternateContent xmlns:mc="http://schemas.openxmlformats.org/markup-compatibility/2006">
-        <mc:Choice xmlns:a14="http://schemas.microsoft.com/office/drawing/2010/main" Requires="a14">
+      <mc:AlternateContent xmlns:mc="http://schemas.openxmlformats.org/markup-compatibility/2006" xmlns:a14="http://schemas.microsoft.com/office/drawing/2010/main">
+        <mc:Choice Requires="a14">
           <p:sp>
             <p:nvSpPr>
               <p:cNvPr id="30" name="TextBox 29"/>
@@ -12371,7 +12299,7 @@
             </p:txBody>
           </p:sp>
         </mc:Choice>
-        <mc:Fallback>
+        <mc:Fallback xmlns="">
           <p:sp>
             <p:nvSpPr>
               <p:cNvPr id="30" name="TextBox 29"/>
@@ -14985,8 +14913,8 @@
           </a:p>
         </p:txBody>
       </p:sp>
-      <mc:AlternateContent xmlns:mc="http://schemas.openxmlformats.org/markup-compatibility/2006">
-        <mc:Choice xmlns:a14="http://schemas.microsoft.com/office/drawing/2010/main" Requires="a14">
+      <mc:AlternateContent xmlns:mc="http://schemas.openxmlformats.org/markup-compatibility/2006" xmlns:a14="http://schemas.microsoft.com/office/drawing/2010/main">
+        <mc:Choice Requires="a14">
           <p:sp>
             <p:nvSpPr>
               <p:cNvPr id="22" name="TextBox 21"/>
@@ -15031,7 +14959,7 @@
             </p:txBody>
           </p:sp>
         </mc:Choice>
-        <mc:Fallback>
+        <mc:Fallback xmlns="">
           <p:sp>
             <p:nvSpPr>
               <p:cNvPr id="22" name="TextBox 21"/>
@@ -16145,8 +16073,8 @@
         </p:nvSpPr>
         <p:spPr>
           <a:xfrm>
-            <a:off x="615297" y="401652"/>
-            <a:ext cx="7810856" cy="5896598"/>
+            <a:off x="0" y="0"/>
+            <a:ext cx="9144000" cy="6858000"/>
           </a:xfrm>
           <a:prstGeom prst="rect">
             <a:avLst/>
@@ -18963,8 +18891,8 @@
         </p:nvSpPr>
         <p:spPr>
           <a:xfrm>
-            <a:off x="666572" y="384561"/>
-            <a:ext cx="7810856" cy="5896598"/>
+            <a:off x="0" y="0"/>
+            <a:ext cx="9144000" cy="6858000"/>
           </a:xfrm>
           <a:prstGeom prst="rect">
             <a:avLst/>

</xml_diff>